<commit_message>
Machine Learning Project Lifecycle is added.
</commit_message>
<xml_diff>
--- a/MLLifeCycle/MachineLearningProjectLifecycle.pptx
+++ b/MLLifeCycle/MachineLearningProjectLifecycle.pptx
@@ -7,41 +7,47 @@
   <p:sldIdLst>
     <p:sldId id="257" r:id="rId2"/>
     <p:sldId id="258" r:id="rId3"/>
-    <p:sldId id="259" r:id="rId4"/>
-    <p:sldId id="260" r:id="rId5"/>
-    <p:sldId id="261" r:id="rId6"/>
-    <p:sldId id="270" r:id="rId7"/>
-    <p:sldId id="271" r:id="rId8"/>
-    <p:sldId id="272" r:id="rId9"/>
-    <p:sldId id="273" r:id="rId10"/>
-    <p:sldId id="262" r:id="rId11"/>
-    <p:sldId id="274" r:id="rId12"/>
-    <p:sldId id="263" r:id="rId13"/>
-    <p:sldId id="264" r:id="rId14"/>
-    <p:sldId id="265" r:id="rId15"/>
-    <p:sldId id="266" r:id="rId16"/>
-    <p:sldId id="267" r:id="rId17"/>
-    <p:sldId id="275" r:id="rId18"/>
-    <p:sldId id="276" r:id="rId19"/>
-    <p:sldId id="268" r:id="rId20"/>
-    <p:sldId id="277" r:id="rId21"/>
-    <p:sldId id="278" r:id="rId22"/>
-    <p:sldId id="279" r:id="rId23"/>
-    <p:sldId id="280" r:id="rId24"/>
-    <p:sldId id="269" r:id="rId25"/>
-    <p:sldId id="282" r:id="rId26"/>
-    <p:sldId id="283" r:id="rId27"/>
-    <p:sldId id="284" r:id="rId28"/>
-    <p:sldId id="285" r:id="rId29"/>
-    <p:sldId id="281" r:id="rId30"/>
-    <p:sldId id="288" r:id="rId31"/>
-    <p:sldId id="290" r:id="rId32"/>
-    <p:sldId id="289" r:id="rId33"/>
-    <p:sldId id="291" r:id="rId34"/>
-    <p:sldId id="292" r:id="rId35"/>
-    <p:sldId id="293" r:id="rId36"/>
-    <p:sldId id="294" r:id="rId37"/>
-    <p:sldId id="287" r:id="rId38"/>
+    <p:sldId id="260" r:id="rId4"/>
+    <p:sldId id="261" r:id="rId5"/>
+    <p:sldId id="270" r:id="rId6"/>
+    <p:sldId id="271" r:id="rId7"/>
+    <p:sldId id="272" r:id="rId8"/>
+    <p:sldId id="273" r:id="rId9"/>
+    <p:sldId id="262" r:id="rId10"/>
+    <p:sldId id="274" r:id="rId11"/>
+    <p:sldId id="263" r:id="rId12"/>
+    <p:sldId id="264" r:id="rId13"/>
+    <p:sldId id="265" r:id="rId14"/>
+    <p:sldId id="266" r:id="rId15"/>
+    <p:sldId id="267" r:id="rId16"/>
+    <p:sldId id="275" r:id="rId17"/>
+    <p:sldId id="276" r:id="rId18"/>
+    <p:sldId id="268" r:id="rId19"/>
+    <p:sldId id="277" r:id="rId20"/>
+    <p:sldId id="278" r:id="rId21"/>
+    <p:sldId id="296" r:id="rId22"/>
+    <p:sldId id="295" r:id="rId23"/>
+    <p:sldId id="279" r:id="rId24"/>
+    <p:sldId id="297" r:id="rId25"/>
+    <p:sldId id="280" r:id="rId26"/>
+    <p:sldId id="298" r:id="rId27"/>
+    <p:sldId id="269" r:id="rId28"/>
+    <p:sldId id="282" r:id="rId29"/>
+    <p:sldId id="283" r:id="rId30"/>
+    <p:sldId id="284" r:id="rId31"/>
+    <p:sldId id="299" r:id="rId32"/>
+    <p:sldId id="285" r:id="rId33"/>
+    <p:sldId id="281" r:id="rId34"/>
+    <p:sldId id="288" r:id="rId35"/>
+    <p:sldId id="290" r:id="rId36"/>
+    <p:sldId id="289" r:id="rId37"/>
+    <p:sldId id="302" r:id="rId38"/>
+    <p:sldId id="291" r:id="rId39"/>
+    <p:sldId id="292" r:id="rId40"/>
+    <p:sldId id="293" r:id="rId41"/>
+    <p:sldId id="300" r:id="rId42"/>
+    <p:sldId id="294" r:id="rId43"/>
+    <p:sldId id="287" r:id="rId44"/>
   </p:sldIdLst>
   <p:sldSz cx="9144000" cy="6858000" type="screen4x3"/>
   <p:notesSz cx="6858000" cy="9144000"/>
@@ -325,7 +331,7 @@
             <a:fld id="{1D8BD707-D9CF-40AE-B4C6-C98DA3205C09}" type="datetimeFigureOut">
               <a:rPr lang="en-US" smtClean="0"/>
               <a:pPr/>
-              <a:t>7/11/2022</a:t>
+              <a:t>12/19/2022</a:t>
             </a:fld>
             <a:endParaRPr lang="en-US"/>
           </a:p>
@@ -492,7 +498,7 @@
             <a:fld id="{1D8BD707-D9CF-40AE-B4C6-C98DA3205C09}" type="datetimeFigureOut">
               <a:rPr lang="en-US" smtClean="0"/>
               <a:pPr/>
-              <a:t>7/11/2022</a:t>
+              <a:t>12/19/2022</a:t>
             </a:fld>
             <a:endParaRPr lang="en-US"/>
           </a:p>
@@ -669,7 +675,7 @@
             <a:fld id="{1D8BD707-D9CF-40AE-B4C6-C98DA3205C09}" type="datetimeFigureOut">
               <a:rPr lang="en-US" smtClean="0"/>
               <a:pPr/>
-              <a:t>7/11/2022</a:t>
+              <a:t>12/19/2022</a:t>
             </a:fld>
             <a:endParaRPr lang="en-US"/>
           </a:p>
@@ -836,7 +842,7 @@
             <a:fld id="{1D8BD707-D9CF-40AE-B4C6-C98DA3205C09}" type="datetimeFigureOut">
               <a:rPr lang="en-US" smtClean="0"/>
               <a:pPr/>
-              <a:t>7/11/2022</a:t>
+              <a:t>12/19/2022</a:t>
             </a:fld>
             <a:endParaRPr lang="en-US"/>
           </a:p>
@@ -1079,7 +1085,7 @@
             <a:fld id="{1D8BD707-D9CF-40AE-B4C6-C98DA3205C09}" type="datetimeFigureOut">
               <a:rPr lang="en-US" smtClean="0"/>
               <a:pPr/>
-              <a:t>7/11/2022</a:t>
+              <a:t>12/19/2022</a:t>
             </a:fld>
             <a:endParaRPr lang="en-US"/>
           </a:p>
@@ -1364,7 +1370,7 @@
             <a:fld id="{1D8BD707-D9CF-40AE-B4C6-C98DA3205C09}" type="datetimeFigureOut">
               <a:rPr lang="en-US" smtClean="0"/>
               <a:pPr/>
-              <a:t>7/11/2022</a:t>
+              <a:t>12/19/2022</a:t>
             </a:fld>
             <a:endParaRPr lang="en-US"/>
           </a:p>
@@ -1783,7 +1789,7 @@
             <a:fld id="{1D8BD707-D9CF-40AE-B4C6-C98DA3205C09}" type="datetimeFigureOut">
               <a:rPr lang="en-US" smtClean="0"/>
               <a:pPr/>
-              <a:t>7/11/2022</a:t>
+              <a:t>12/19/2022</a:t>
             </a:fld>
             <a:endParaRPr lang="en-US"/>
           </a:p>
@@ -1898,7 +1904,7 @@
             <a:fld id="{1D8BD707-D9CF-40AE-B4C6-C98DA3205C09}" type="datetimeFigureOut">
               <a:rPr lang="en-US" smtClean="0"/>
               <a:pPr/>
-              <a:t>7/11/2022</a:t>
+              <a:t>12/19/2022</a:t>
             </a:fld>
             <a:endParaRPr lang="en-US"/>
           </a:p>
@@ -1990,7 +1996,7 @@
             <a:fld id="{1D8BD707-D9CF-40AE-B4C6-C98DA3205C09}" type="datetimeFigureOut">
               <a:rPr lang="en-US" smtClean="0"/>
               <a:pPr/>
-              <a:t>7/11/2022</a:t>
+              <a:t>12/19/2022</a:t>
             </a:fld>
             <a:endParaRPr lang="en-US"/>
           </a:p>
@@ -2264,7 +2270,7 @@
             <a:fld id="{1D8BD707-D9CF-40AE-B4C6-C98DA3205C09}" type="datetimeFigureOut">
               <a:rPr lang="en-US" smtClean="0"/>
               <a:pPr/>
-              <a:t>7/11/2022</a:t>
+              <a:t>12/19/2022</a:t>
             </a:fld>
             <a:endParaRPr lang="en-US"/>
           </a:p>
@@ -2514,7 +2520,7 @@
             <a:fld id="{1D8BD707-D9CF-40AE-B4C6-C98DA3205C09}" type="datetimeFigureOut">
               <a:rPr lang="en-US" smtClean="0"/>
               <a:pPr/>
-              <a:t>7/11/2022</a:t>
+              <a:t>12/19/2022</a:t>
             </a:fld>
             <a:endParaRPr lang="en-US"/>
           </a:p>
@@ -2724,7 +2730,7 @@
             <a:fld id="{1D8BD707-D9CF-40AE-B4C6-C98DA3205C09}" type="datetimeFigureOut">
               <a:rPr lang="en-US" smtClean="0"/>
               <a:pPr/>
-              <a:t>7/11/2022</a:t>
+              <a:t>12/19/2022</a:t>
             </a:fld>
             <a:endParaRPr lang="en-US"/>
           </a:p>
@@ -3139,20 +3145,14 @@
           <a:lstStyle/>
           <a:p>
             <a:r>
-              <a:rPr lang="en-US" b="1" dirty="0" smtClean="0"/>
-              <a:t>Pritam Prakash Shete</a:t>
-            </a:r>
-          </a:p>
-          <a:p>
-            <a:r>
               <a:rPr lang="en-US" dirty="0" smtClean="0"/>
-              <a:t>Scientific Officer F,</a:t>
+              <a:t>Computer Division</a:t>
             </a:r>
           </a:p>
           <a:p>
             <a:r>
               <a:rPr lang="en-US" dirty="0" smtClean="0"/>
-              <a:t>Computer Division, BARC</a:t>
+              <a:t>Bhabha Atomic Research Centre</a:t>
             </a:r>
             <a:endParaRPr lang="en-US" dirty="0"/>
           </a:p>
@@ -3207,7 +3207,7 @@
           <a:p>
             <a:r>
               <a:rPr lang="en-IN" dirty="0" smtClean="0"/>
-              <a:t>Dataset Collection</a:t>
+              <a:t>Machine Learning Dataset Types</a:t>
             </a:r>
             <a:endParaRPr lang="en-IN" dirty="0"/>
           </a:p>
@@ -3225,44 +3225,53 @@
         </p:nvSpPr>
         <p:spPr/>
         <p:txBody>
-          <a:bodyPr>
-            <a:normAutofit/>
-          </a:bodyPr>
-          <a:lstStyle/>
-          <a:p>
-            <a:r>
-              <a:rPr lang="en-IN" dirty="0" smtClean="0"/>
-              <a:t>Machine learning dataset types</a:t>
-            </a:r>
-          </a:p>
-          <a:p>
-            <a:r>
-              <a:rPr lang="en-IN" dirty="0" smtClean="0"/>
-              <a:t>Establish baseline</a:t>
-            </a:r>
-          </a:p>
-          <a:p>
-            <a:r>
-              <a:rPr lang="en-IN" dirty="0" smtClean="0"/>
-              <a:t>Label dataset</a:t>
-            </a:r>
-          </a:p>
-          <a:p>
-            <a:r>
-              <a:rPr lang="en-IN" dirty="0" smtClean="0"/>
-              <a:t>Validate dataset</a:t>
-            </a:r>
-          </a:p>
-          <a:p>
-            <a:r>
-              <a:rPr lang="en-IN" dirty="0" smtClean="0"/>
-              <a:t>Organize dataset</a:t>
-            </a:r>
-          </a:p>
-          <a:p>
-            <a:r>
-              <a:rPr lang="en-IN" dirty="0" smtClean="0"/>
-              <a:t>Feature engineering</a:t>
+          <a:bodyPr/>
+          <a:lstStyle/>
+          <a:p>
+            <a:r>
+              <a:rPr lang="en-IN" dirty="0" smtClean="0"/>
+              <a:t>Structured dataset </a:t>
+            </a:r>
+          </a:p>
+          <a:p>
+            <a:pPr lvl="1"/>
+            <a:r>
+              <a:rPr lang="en-IN" dirty="0" smtClean="0"/>
+              <a:t>Spreadsheet dataset</a:t>
+            </a:r>
+          </a:p>
+          <a:p>
+            <a:r>
+              <a:rPr lang="en-IN" dirty="0" smtClean="0"/>
+              <a:t>Unstructured dataset </a:t>
+            </a:r>
+          </a:p>
+          <a:p>
+            <a:pPr lvl="1"/>
+            <a:r>
+              <a:rPr lang="en-IN" dirty="0" smtClean="0"/>
+              <a:t>Images</a:t>
+            </a:r>
+          </a:p>
+          <a:p>
+            <a:pPr lvl="1"/>
+            <a:r>
+              <a:rPr lang="en-IN" dirty="0" smtClean="0"/>
+              <a:t>Videos </a:t>
+            </a:r>
+          </a:p>
+          <a:p>
+            <a:pPr lvl="1"/>
+            <a:r>
+              <a:rPr lang="en-IN" dirty="0" smtClean="0"/>
+              <a:t>Audios</a:t>
+            </a:r>
+          </a:p>
+          <a:p>
+            <a:pPr lvl="1"/>
+            <a:r>
+              <a:rPr lang="en-IN" dirty="0" smtClean="0"/>
+              <a:t>Texts</a:t>
             </a:r>
             <a:endParaRPr lang="en-IN" dirty="0"/>
           </a:p>
@@ -3317,7 +3326,7 @@
           <a:p>
             <a:r>
               <a:rPr lang="en-IN" dirty="0" smtClean="0"/>
-              <a:t>Machine Learning Dataset Types</a:t>
+              <a:t>Establish Baseline</a:t>
             </a:r>
             <a:endParaRPr lang="en-IN" dirty="0"/>
           </a:p>
@@ -3340,50 +3349,34 @@
           <a:p>
             <a:r>
               <a:rPr lang="en-IN" dirty="0" smtClean="0"/>
-              <a:t>Structured dataset </a:t>
-            </a:r>
-          </a:p>
-          <a:p>
-            <a:pPr lvl="1"/>
-            <a:r>
-              <a:rPr lang="en-IN" dirty="0" smtClean="0"/>
-              <a:t>Spreadsheet dataset</a:t>
-            </a:r>
-          </a:p>
-          <a:p>
-            <a:r>
-              <a:rPr lang="en-IN" dirty="0" smtClean="0"/>
-              <a:t>Unstructured dataset </a:t>
-            </a:r>
-          </a:p>
-          <a:p>
-            <a:pPr lvl="1"/>
-            <a:r>
-              <a:rPr lang="en-IN" dirty="0" smtClean="0"/>
-              <a:t>Images</a:t>
-            </a:r>
-          </a:p>
-          <a:p>
-            <a:pPr lvl="1"/>
-            <a:r>
-              <a:rPr lang="en-IN" dirty="0" smtClean="0"/>
-              <a:t>Videos </a:t>
-            </a:r>
-          </a:p>
-          <a:p>
-            <a:pPr lvl="1"/>
-            <a:r>
-              <a:rPr lang="en-IN" dirty="0" smtClean="0"/>
-              <a:t>Audios</a:t>
-            </a:r>
-          </a:p>
-          <a:p>
-            <a:pPr lvl="1"/>
-            <a:r>
-              <a:rPr lang="en-IN" dirty="0" smtClean="0"/>
-              <a:t>Texts</a:t>
-            </a:r>
-            <a:endParaRPr lang="en-IN" dirty="0"/>
+              <a:t>Estimate initial metrics for base line model</a:t>
+            </a:r>
+          </a:p>
+          <a:p>
+            <a:pPr lvl="1"/>
+            <a:r>
+              <a:rPr lang="en-IN" dirty="0" smtClean="0"/>
+              <a:t>Base accuracy</a:t>
+            </a:r>
+          </a:p>
+          <a:p>
+            <a:pPr lvl="1"/>
+            <a:r>
+              <a:rPr lang="en-IN" dirty="0" smtClean="0"/>
+              <a:t>Base performance</a:t>
+            </a:r>
+          </a:p>
+          <a:p>
+            <a:r>
+              <a:rPr lang="en-IN" dirty="0" smtClean="0"/>
+              <a:t>Previous research work</a:t>
+            </a:r>
+          </a:p>
+          <a:p>
+            <a:r>
+              <a:rPr lang="en-IN" dirty="0" smtClean="0"/>
+              <a:t>Previous ML or non-ML projects</a:t>
+            </a:r>
           </a:p>
         </p:txBody>
       </p:sp>
@@ -3436,7 +3429,7 @@
           <a:p>
             <a:r>
               <a:rPr lang="en-IN" dirty="0" smtClean="0"/>
-              <a:t>Establish Baseline</a:t>
+              <a:t>Label Dataset</a:t>
             </a:r>
             <a:endParaRPr lang="en-IN" dirty="0"/>
           </a:p>
@@ -3459,34 +3452,42 @@
           <a:p>
             <a:r>
               <a:rPr lang="en-IN" dirty="0" smtClean="0"/>
-              <a:t>Estimate initial metrics for base line model</a:t>
-            </a:r>
-          </a:p>
-          <a:p>
-            <a:pPr lvl="1"/>
-            <a:r>
-              <a:rPr lang="en-IN" dirty="0" smtClean="0"/>
-              <a:t>Base accuracy</a:t>
-            </a:r>
-          </a:p>
-          <a:p>
-            <a:pPr lvl="1"/>
-            <a:r>
-              <a:rPr lang="en-IN" dirty="0" smtClean="0"/>
-              <a:t>Base performance</a:t>
-            </a:r>
-          </a:p>
-          <a:p>
-            <a:r>
-              <a:rPr lang="en-IN" dirty="0" smtClean="0"/>
-              <a:t>Previous research work</a:t>
-            </a:r>
-          </a:p>
-          <a:p>
-            <a:r>
-              <a:rPr lang="en-IN" dirty="0" smtClean="0"/>
-              <a:t>Previous ML or non-ML projects</a:t>
-            </a:r>
+              <a:t>Use open dataset</a:t>
+            </a:r>
+          </a:p>
+          <a:p>
+            <a:pPr lvl="1"/>
+            <a:r>
+              <a:rPr lang="en-IN" dirty="0" smtClean="0"/>
+              <a:t>Availability </a:t>
+            </a:r>
+          </a:p>
+          <a:p>
+            <a:pPr lvl="1"/>
+            <a:r>
+              <a:rPr lang="en-IN" dirty="0" smtClean="0"/>
+              <a:t>Dataset license – Research v/s Commercial</a:t>
+            </a:r>
+          </a:p>
+          <a:p>
+            <a:r>
+              <a:rPr lang="en-IN" dirty="0" smtClean="0"/>
+              <a:t>Collect in-house dataset</a:t>
+            </a:r>
+          </a:p>
+          <a:p>
+            <a:pPr lvl="1"/>
+            <a:r>
+              <a:rPr lang="en-IN" dirty="0" smtClean="0"/>
+              <a:t>Effort estimation</a:t>
+            </a:r>
+          </a:p>
+          <a:p>
+            <a:r>
+              <a:rPr lang="en-IN" dirty="0" smtClean="0"/>
+              <a:t>Clean dataset</a:t>
+            </a:r>
+            <a:endParaRPr lang="en-IN" dirty="0"/>
           </a:p>
         </p:txBody>
       </p:sp>
@@ -3539,7 +3540,7 @@
           <a:p>
             <a:r>
               <a:rPr lang="en-IN" dirty="0" smtClean="0"/>
-              <a:t>Label Dataset</a:t>
+              <a:t>Validate Dataset</a:t>
             </a:r>
             <a:endParaRPr lang="en-IN" dirty="0"/>
           </a:p>
@@ -3557,45 +3558,56 @@
         </p:nvSpPr>
         <p:spPr/>
         <p:txBody>
-          <a:bodyPr/>
-          <a:lstStyle/>
-          <a:p>
-            <a:r>
-              <a:rPr lang="en-IN" dirty="0" smtClean="0"/>
-              <a:t>Use open dataset</a:t>
-            </a:r>
-          </a:p>
-          <a:p>
-            <a:pPr lvl="1"/>
-            <a:r>
-              <a:rPr lang="en-IN" dirty="0" smtClean="0"/>
-              <a:t>Availability </a:t>
-            </a:r>
-          </a:p>
-          <a:p>
-            <a:pPr lvl="1"/>
-            <a:r>
-              <a:rPr lang="en-IN" dirty="0" smtClean="0"/>
-              <a:t>Dataset license – Research v/s Commercial</a:t>
-            </a:r>
-          </a:p>
-          <a:p>
-            <a:r>
-              <a:rPr lang="en-IN" dirty="0" smtClean="0"/>
-              <a:t>Collect in-house dataset</a:t>
-            </a:r>
-          </a:p>
-          <a:p>
-            <a:pPr lvl="1"/>
-            <a:r>
-              <a:rPr lang="en-IN" dirty="0" smtClean="0"/>
-              <a:t>Effort estimation</a:t>
-            </a:r>
-          </a:p>
-          <a:p>
-            <a:r>
-              <a:rPr lang="en-IN" dirty="0" smtClean="0"/>
-              <a:t>Clean dataset</a:t>
+          <a:bodyPr>
+            <a:normAutofit/>
+          </a:bodyPr>
+          <a:lstStyle/>
+          <a:p>
+            <a:r>
+              <a:rPr lang="en-IN" dirty="0" smtClean="0"/>
+              <a:t>Compute statistics on dataset</a:t>
+            </a:r>
+          </a:p>
+          <a:p>
+            <a:r>
+              <a:rPr lang="en-IN" dirty="0" smtClean="0"/>
+              <a:t>Understand dataset schema</a:t>
+            </a:r>
+          </a:p>
+          <a:p>
+            <a:r>
+              <a:rPr lang="en-IN" dirty="0" smtClean="0"/>
+              <a:t>Identify inconsistencies in </a:t>
+            </a:r>
+          </a:p>
+          <a:p>
+            <a:pPr lvl="1"/>
+            <a:r>
+              <a:rPr lang="en-IN" dirty="0" smtClean="0"/>
+              <a:t>Training, validation, and testing dataset</a:t>
+            </a:r>
+          </a:p>
+          <a:p>
+            <a:r>
+              <a:rPr lang="en-IN" dirty="0" smtClean="0"/>
+              <a:t>Identify </a:t>
+            </a:r>
+            <a:r>
+              <a:rPr lang="en-IN" dirty="0" smtClean="0"/>
+              <a:t>data drift</a:t>
+            </a:r>
+            <a:endParaRPr lang="en-IN" dirty="0" smtClean="0"/>
+          </a:p>
+          <a:p>
+            <a:r>
+              <a:rPr lang="en-IN" dirty="0" smtClean="0"/>
+              <a:t>Identify concept drift</a:t>
+            </a:r>
+          </a:p>
+          <a:p>
+            <a:r>
+              <a:rPr lang="en-IN" dirty="0" smtClean="0"/>
+              <a:t>Identify training-serving dataset skew</a:t>
             </a:r>
             <a:endParaRPr lang="en-IN" dirty="0"/>
           </a:p>
@@ -3650,7 +3662,7 @@
           <a:p>
             <a:r>
               <a:rPr lang="en-IN" dirty="0" smtClean="0"/>
-              <a:t>Validate Dataset</a:t>
+              <a:t>Dataset Schema</a:t>
             </a:r>
             <a:endParaRPr lang="en-IN" dirty="0"/>
           </a:p>
@@ -3668,51 +3680,32 @@
         </p:nvSpPr>
         <p:spPr/>
         <p:txBody>
-          <a:bodyPr>
-            <a:normAutofit/>
-          </a:bodyPr>
-          <a:lstStyle/>
-          <a:p>
-            <a:r>
-              <a:rPr lang="en-IN" dirty="0" smtClean="0"/>
-              <a:t>Compute statistics on dataset</a:t>
-            </a:r>
-          </a:p>
-          <a:p>
-            <a:r>
-              <a:rPr lang="en-IN" dirty="0" smtClean="0"/>
-              <a:t>Understand dataset schema</a:t>
-            </a:r>
-          </a:p>
-          <a:p>
-            <a:r>
-              <a:rPr lang="en-IN" dirty="0" smtClean="0"/>
-              <a:t>Identify inconsistencies in </a:t>
-            </a:r>
-          </a:p>
-          <a:p>
-            <a:pPr lvl="1"/>
-            <a:r>
-              <a:rPr lang="en-IN" dirty="0" smtClean="0"/>
-              <a:t>Training, validation, and testing dataset</a:t>
-            </a:r>
-          </a:p>
-          <a:p>
-            <a:r>
-              <a:rPr lang="en-IN" dirty="0" smtClean="0"/>
-              <a:t>Identify dataset drift</a:t>
-            </a:r>
-          </a:p>
-          <a:p>
-            <a:r>
-              <a:rPr lang="en-IN" dirty="0" smtClean="0"/>
-              <a:t>Identify concept drift</a:t>
-            </a:r>
-          </a:p>
-          <a:p>
-            <a:r>
-              <a:rPr lang="en-IN" dirty="0" smtClean="0"/>
-              <a:t>Identify training-serving dataset skew</a:t>
+          <a:bodyPr/>
+          <a:lstStyle/>
+          <a:p>
+            <a:r>
+              <a:rPr lang="en-IN" dirty="0" smtClean="0"/>
+              <a:t>Define data type for each feature</a:t>
+            </a:r>
+          </a:p>
+          <a:p>
+            <a:r>
+              <a:rPr lang="en-IN" dirty="0" smtClean="0"/>
+              <a:t>Identify samples with </a:t>
+            </a:r>
+          </a:p>
+          <a:p>
+            <a:pPr lvl="1"/>
+            <a:r>
+              <a:rPr lang="en-IN" dirty="0" smtClean="0"/>
+              <a:t>Incorrect values</a:t>
+            </a:r>
+          </a:p>
+          <a:p>
+            <a:pPr lvl="1"/>
+            <a:r>
+              <a:rPr lang="en-IN" dirty="0" smtClean="0"/>
+              <a:t>Missing values</a:t>
             </a:r>
             <a:endParaRPr lang="en-IN" dirty="0"/>
           </a:p>
@@ -3767,7 +3760,11 @@
           <a:p>
             <a:r>
               <a:rPr lang="en-IN" dirty="0" smtClean="0"/>
-              <a:t>Dataset Schema</a:t>
+              <a:t>Data </a:t>
+            </a:r>
+            <a:r>
+              <a:rPr lang="en-IN" dirty="0" err="1" smtClean="0"/>
+              <a:t>Curation</a:t>
             </a:r>
             <a:endParaRPr lang="en-IN" dirty="0"/>
           </a:p>
@@ -3790,27 +3787,25 @@
           <a:p>
             <a:r>
               <a:rPr lang="en-IN" dirty="0" smtClean="0"/>
-              <a:t>Define data type for each feature</a:t>
-            </a:r>
-          </a:p>
-          <a:p>
-            <a:r>
-              <a:rPr lang="en-IN" dirty="0" smtClean="0"/>
-              <a:t>Identify samples with </a:t>
-            </a:r>
-          </a:p>
-          <a:p>
-            <a:pPr lvl="1"/>
-            <a:r>
-              <a:rPr lang="en-IN" dirty="0" smtClean="0"/>
-              <a:t>Incorrect values</a:t>
-            </a:r>
-          </a:p>
-          <a:p>
-            <a:pPr lvl="1"/>
-            <a:r>
-              <a:rPr lang="en-IN" dirty="0" smtClean="0"/>
-              <a:t>Missing values</a:t>
+              <a:t>Manage data throughout lifecycle</a:t>
+            </a:r>
+          </a:p>
+          <a:p>
+            <a:r>
+              <a:rPr lang="en-IN" dirty="0" smtClean="0"/>
+              <a:t>Model quality and performance</a:t>
+            </a:r>
+          </a:p>
+          <a:p>
+            <a:r>
+              <a:rPr lang="en-IN" dirty="0" smtClean="0"/>
+              <a:t>Collect (select and curate) </a:t>
+            </a:r>
+          </a:p>
+          <a:p>
+            <a:r>
+              <a:rPr lang="en-IN" dirty="0" smtClean="0"/>
+              <a:t>Label + Train + Deploy</a:t>
             </a:r>
             <a:endParaRPr lang="en-IN" dirty="0"/>
           </a:p>
@@ -3865,11 +3860,7 @@
           <a:p>
             <a:r>
               <a:rPr lang="en-IN" dirty="0" smtClean="0"/>
-              <a:t>Data </a:t>
-            </a:r>
-            <a:r>
-              <a:rPr lang="en-IN" dirty="0" err="1" smtClean="0"/>
-              <a:t>Curation</a:t>
+              <a:t>Organize Dataset</a:t>
             </a:r>
             <a:endParaRPr lang="en-IN" dirty="0"/>
           </a:p>
@@ -3887,30 +3878,74 @@
         </p:nvSpPr>
         <p:spPr/>
         <p:txBody>
-          <a:bodyPr/>
-          <a:lstStyle/>
-          <a:p>
-            <a:r>
-              <a:rPr lang="en-IN" dirty="0" smtClean="0"/>
-              <a:t>Manage data throughout lifecycle</a:t>
-            </a:r>
-          </a:p>
-          <a:p>
-            <a:r>
-              <a:rPr lang="en-IN" dirty="0" smtClean="0"/>
-              <a:t>Model quality and performance</a:t>
-            </a:r>
-          </a:p>
-          <a:p>
-            <a:r>
-              <a:rPr lang="en-IN" dirty="0" smtClean="0"/>
-              <a:t>Collect (select and curate) </a:t>
-            </a:r>
-          </a:p>
-          <a:p>
-            <a:r>
-              <a:rPr lang="en-IN" dirty="0" smtClean="0"/>
-              <a:t>Label + Train + Deploy</a:t>
+          <a:bodyPr>
+            <a:normAutofit fontScale="92500" lnSpcReduction="20000"/>
+          </a:bodyPr>
+          <a:lstStyle/>
+          <a:p>
+            <a:r>
+              <a:rPr lang="en-IN" dirty="0" smtClean="0"/>
+              <a:t>Multiple parts – Similar statistical properties</a:t>
+            </a:r>
+          </a:p>
+          <a:p>
+            <a:r>
+              <a:rPr lang="en-IN" dirty="0" smtClean="0"/>
+              <a:t>Training dataset</a:t>
+            </a:r>
+          </a:p>
+          <a:p>
+            <a:pPr lvl="1"/>
+            <a:r>
+              <a:rPr lang="en-IN" dirty="0" smtClean="0"/>
+              <a:t>Estimate model parameters</a:t>
+            </a:r>
+          </a:p>
+          <a:p>
+            <a:r>
+              <a:rPr lang="en-IN" dirty="0" smtClean="0"/>
+              <a:t>Validation dataset </a:t>
+            </a:r>
+          </a:p>
+          <a:p>
+            <a:pPr lvl="1"/>
+            <a:r>
+              <a:rPr lang="en-IN" dirty="0" smtClean="0"/>
+              <a:t>Evaluate performance of model during training</a:t>
+            </a:r>
+          </a:p>
+          <a:p>
+            <a:pPr lvl="1"/>
+            <a:r>
+              <a:rPr lang="en-IN" dirty="0" smtClean="0"/>
+              <a:t>Stop model training</a:t>
+            </a:r>
+          </a:p>
+          <a:p>
+            <a:pPr lvl="1"/>
+            <a:r>
+              <a:rPr lang="en-IN" dirty="0" smtClean="0"/>
+              <a:t>Select hyper parameters</a:t>
+            </a:r>
+          </a:p>
+          <a:p>
+            <a:r>
+              <a:rPr lang="en-IN" dirty="0" smtClean="0"/>
+              <a:t>Testing dataset </a:t>
+            </a:r>
+          </a:p>
+          <a:p>
+            <a:pPr lvl="1"/>
+            <a:r>
+              <a:rPr lang="en-IN" dirty="0" smtClean="0"/>
+              <a:t>Evaluate performance of model after training</a:t>
+            </a:r>
+          </a:p>
+          <a:p>
+            <a:pPr lvl="1"/>
+            <a:r>
+              <a:rPr lang="en-IN" dirty="0" smtClean="0"/>
+              <a:t>Performance of model on unseen dataset</a:t>
             </a:r>
             <a:endParaRPr lang="en-IN" dirty="0"/>
           </a:p>
@@ -3965,7 +4000,7 @@
           <a:p>
             <a:r>
               <a:rPr lang="en-IN" dirty="0" smtClean="0"/>
-              <a:t>Organize Dataset</a:t>
+              <a:t>Feature Engineering</a:t>
             </a:r>
             <a:endParaRPr lang="en-IN" dirty="0"/>
           </a:p>
@@ -3990,67 +4025,58 @@
           <a:p>
             <a:r>
               <a:rPr lang="en-IN" dirty="0" smtClean="0"/>
-              <a:t>Multiple parts – Similar statistical properties</a:t>
-            </a:r>
-          </a:p>
-          <a:p>
-            <a:r>
-              <a:rPr lang="en-IN" dirty="0" smtClean="0"/>
-              <a:t>Training dataset</a:t>
-            </a:r>
-          </a:p>
-          <a:p>
-            <a:pPr lvl="1"/>
-            <a:r>
-              <a:rPr lang="en-IN" dirty="0" smtClean="0"/>
-              <a:t>Estimate model parameters</a:t>
-            </a:r>
-          </a:p>
-          <a:p>
-            <a:r>
-              <a:rPr lang="en-IN" dirty="0" smtClean="0"/>
-              <a:t>Validation dataset </a:t>
-            </a:r>
-          </a:p>
-          <a:p>
-            <a:pPr lvl="1"/>
-            <a:r>
-              <a:rPr lang="en-IN" dirty="0" smtClean="0"/>
-              <a:t>Evaluate performance of model during training</a:t>
-            </a:r>
-          </a:p>
-          <a:p>
-            <a:pPr lvl="1"/>
-            <a:r>
-              <a:rPr lang="en-IN" dirty="0" smtClean="0"/>
-              <a:t>Stop model training</a:t>
-            </a:r>
-          </a:p>
-          <a:p>
-            <a:pPr lvl="1"/>
-            <a:r>
-              <a:rPr lang="en-IN" dirty="0" smtClean="0"/>
-              <a:t>Select hyper parameters</a:t>
-            </a:r>
-          </a:p>
-          <a:p>
-            <a:r>
-              <a:rPr lang="en-IN" dirty="0" smtClean="0"/>
-              <a:t>Testing dataset </a:t>
-            </a:r>
-          </a:p>
-          <a:p>
-            <a:pPr lvl="1"/>
-            <a:r>
-              <a:rPr lang="en-IN" dirty="0" smtClean="0"/>
-              <a:t>Evaluate performance of model after training</a:t>
-            </a:r>
-          </a:p>
-          <a:p>
-            <a:pPr lvl="1"/>
-            <a:r>
-              <a:rPr lang="en-IN" dirty="0" smtClean="0"/>
-              <a:t>Performance of model on unseen dataset</a:t>
+              <a:t>Dataset pre-processing</a:t>
+            </a:r>
+          </a:p>
+          <a:p>
+            <a:r>
+              <a:rPr lang="en-IN" dirty="0" smtClean="0"/>
+              <a:t>Dataset transformation</a:t>
+            </a:r>
+          </a:p>
+          <a:p>
+            <a:r>
+              <a:rPr lang="en-IN" dirty="0" smtClean="0"/>
+              <a:t>Input </a:t>
+            </a:r>
+          </a:p>
+          <a:p>
+            <a:pPr lvl="1"/>
+            <a:r>
+              <a:rPr lang="en-IN" dirty="0" smtClean="0"/>
+              <a:t>Single column in dataset before pre-processing</a:t>
+            </a:r>
+          </a:p>
+          <a:p>
+            <a:r>
+              <a:rPr lang="en-IN" dirty="0" smtClean="0"/>
+              <a:t>Feature </a:t>
+            </a:r>
+          </a:p>
+          <a:p>
+            <a:pPr lvl="1"/>
+            <a:r>
+              <a:rPr lang="en-IN" dirty="0" smtClean="0"/>
+              <a:t>Single column in dataset after pre-processing</a:t>
+            </a:r>
+          </a:p>
+          <a:p>
+            <a:r>
+              <a:rPr lang="en-IN" dirty="0" smtClean="0"/>
+              <a:t>Scale numerical values </a:t>
+            </a:r>
+          </a:p>
+          <a:p>
+            <a:pPr lvl="1"/>
+            <a:r>
+              <a:rPr lang="en-IN" dirty="0" smtClean="0"/>
+              <a:t>(0, 1) or (-1, 1) range</a:t>
+            </a:r>
+          </a:p>
+          <a:p>
+            <a:r>
+              <a:rPr lang="en-IN" dirty="0" smtClean="0"/>
+              <a:t>Converting non numerical data values into numerical format</a:t>
             </a:r>
             <a:endParaRPr lang="en-IN" dirty="0"/>
           </a:p>
@@ -4105,7 +4131,7 @@
           <a:p>
             <a:r>
               <a:rPr lang="en-IN" dirty="0" smtClean="0"/>
-              <a:t>Feature Engineering</a:t>
+              <a:t>Modelling</a:t>
             </a:r>
             <a:endParaRPr lang="en-IN" dirty="0"/>
           </a:p>
@@ -4123,65 +4149,58 @@
         </p:nvSpPr>
         <p:spPr/>
         <p:txBody>
-          <a:bodyPr>
-            <a:normAutofit fontScale="92500" lnSpcReduction="20000"/>
-          </a:bodyPr>
-          <a:lstStyle/>
-          <a:p>
-            <a:r>
-              <a:rPr lang="en-IN" dirty="0" smtClean="0"/>
-              <a:t>Dataset pre-processing</a:t>
-            </a:r>
-          </a:p>
-          <a:p>
-            <a:r>
-              <a:rPr lang="en-IN" dirty="0" smtClean="0"/>
-              <a:t>Dataset transformation</a:t>
-            </a:r>
-          </a:p>
-          <a:p>
-            <a:r>
-              <a:rPr lang="en-IN" dirty="0" smtClean="0"/>
-              <a:t>Input </a:t>
-            </a:r>
-          </a:p>
-          <a:p>
-            <a:pPr lvl="1"/>
-            <a:r>
-              <a:rPr lang="en-IN" dirty="0" smtClean="0"/>
-              <a:t>Single column in dataset before pre-processing</a:t>
-            </a:r>
-          </a:p>
-          <a:p>
-            <a:r>
-              <a:rPr lang="en-IN" dirty="0" smtClean="0"/>
-              <a:t>Feature </a:t>
-            </a:r>
-          </a:p>
-          <a:p>
-            <a:pPr lvl="1"/>
-            <a:r>
-              <a:rPr lang="en-IN" dirty="0" smtClean="0"/>
-              <a:t>Single column in dataset after pre-processing</a:t>
-            </a:r>
-          </a:p>
-          <a:p>
-            <a:r>
-              <a:rPr lang="en-IN" dirty="0" smtClean="0"/>
-              <a:t>Scale numerical values </a:t>
-            </a:r>
-          </a:p>
-          <a:p>
-            <a:pPr lvl="1"/>
-            <a:r>
-              <a:rPr lang="en-IN" dirty="0" smtClean="0"/>
-              <a:t>(0, 1) or (-1, 1) range</a:t>
-            </a:r>
-          </a:p>
-          <a:p>
-            <a:r>
-              <a:rPr lang="en-IN" dirty="0" smtClean="0"/>
-              <a:t>Converting non numerical data values into numerical format</a:t>
+          <a:bodyPr/>
+          <a:lstStyle/>
+          <a:p>
+            <a:r>
+              <a:rPr lang="en-IN" dirty="0" smtClean="0"/>
+              <a:t>Iterative process </a:t>
+            </a:r>
+          </a:p>
+          <a:p>
+            <a:pPr lvl="1"/>
+            <a:r>
+              <a:rPr lang="en-IN" dirty="0" smtClean="0"/>
+              <a:t>Model + Hyper parameters </a:t>
+            </a:r>
+          </a:p>
+          <a:p>
+            <a:pPr lvl="1"/>
+            <a:r>
+              <a:rPr lang="en-IN" dirty="0" smtClean="0"/>
+              <a:t>Dataset </a:t>
+            </a:r>
+          </a:p>
+          <a:p>
+            <a:pPr lvl="1"/>
+            <a:r>
+              <a:rPr lang="en-IN" dirty="0" smtClean="0"/>
+              <a:t>Training </a:t>
+            </a:r>
+          </a:p>
+          <a:p>
+            <a:pPr lvl="1"/>
+            <a:r>
+              <a:rPr lang="en-IN" dirty="0" smtClean="0"/>
+              <a:t>Error analysis</a:t>
+            </a:r>
+          </a:p>
+          <a:p>
+            <a:r>
+              <a:rPr lang="en-IN" dirty="0" smtClean="0"/>
+              <a:t>Establish baseline model performance</a:t>
+            </a:r>
+          </a:p>
+          <a:p>
+            <a:r>
+              <a:rPr lang="en-IN" dirty="0" smtClean="0"/>
+              <a:t>Model-centric AI development</a:t>
+            </a:r>
+          </a:p>
+          <a:p>
+            <a:r>
+              <a:rPr lang="en-IN" dirty="0" smtClean="0"/>
+              <a:t>Data-centric AI development</a:t>
             </a:r>
             <a:endParaRPr lang="en-IN" dirty="0"/>
           </a:p>
@@ -4231,12 +4250,14 @@
         </p:nvSpPr>
         <p:spPr/>
         <p:txBody>
-          <a:bodyPr/>
-          <a:lstStyle/>
-          <a:p>
-            <a:r>
-              <a:rPr lang="en-IN" dirty="0" smtClean="0"/>
-              <a:t>Modelling</a:t>
+          <a:bodyPr>
+            <a:normAutofit fontScale="90000"/>
+          </a:bodyPr>
+          <a:lstStyle/>
+          <a:p>
+            <a:r>
+              <a:rPr lang="en-IN" dirty="0" smtClean="0"/>
+              <a:t>Establish Baseline Model Performance</a:t>
             </a:r>
             <a:endParaRPr lang="en-IN" dirty="0"/>
           </a:p>
@@ -4254,58 +4275,72 @@
         </p:nvSpPr>
         <p:spPr/>
         <p:txBody>
-          <a:bodyPr/>
-          <a:lstStyle/>
-          <a:p>
-            <a:r>
-              <a:rPr lang="en-IN" dirty="0" smtClean="0"/>
-              <a:t>Iterative process </a:t>
-            </a:r>
-          </a:p>
-          <a:p>
-            <a:pPr lvl="1"/>
-            <a:r>
-              <a:rPr lang="en-IN" dirty="0" smtClean="0"/>
-              <a:t>Model + Hyper parameters </a:t>
-            </a:r>
-          </a:p>
-          <a:p>
-            <a:pPr lvl="1"/>
-            <a:r>
-              <a:rPr lang="en-IN" dirty="0" smtClean="0"/>
-              <a:t>Dataset </a:t>
-            </a:r>
-          </a:p>
-          <a:p>
-            <a:pPr lvl="1"/>
-            <a:r>
-              <a:rPr lang="en-IN" dirty="0" smtClean="0"/>
-              <a:t>Training </a:t>
-            </a:r>
-          </a:p>
-          <a:p>
-            <a:pPr lvl="1"/>
-            <a:r>
-              <a:rPr lang="en-IN" dirty="0" smtClean="0"/>
-              <a:t>Error analysis</a:t>
-            </a:r>
-          </a:p>
-          <a:p>
-            <a:r>
-              <a:rPr lang="en-IN" dirty="0" smtClean="0"/>
-              <a:t>Establish baseline model performance</a:t>
-            </a:r>
-          </a:p>
-          <a:p>
-            <a:r>
-              <a:rPr lang="en-IN" dirty="0" smtClean="0"/>
-              <a:t>Model-centric AI development</a:t>
-            </a:r>
-          </a:p>
-          <a:p>
-            <a:r>
-              <a:rPr lang="en-IN" dirty="0" smtClean="0"/>
-              <a:t>Data-centric AI development</a:t>
+          <a:bodyPr>
+            <a:normAutofit lnSpcReduction="10000"/>
+          </a:bodyPr>
+          <a:lstStyle/>
+          <a:p>
+            <a:r>
+              <a:rPr lang="en-IN" dirty="0" smtClean="0"/>
+              <a:t>Unstructured dataset</a:t>
+            </a:r>
+          </a:p>
+          <a:p>
+            <a:pPr lvl="1"/>
+            <a:r>
+              <a:rPr lang="en-IN" dirty="0" smtClean="0"/>
+              <a:t>Human Level Performance</a:t>
+            </a:r>
+          </a:p>
+          <a:p>
+            <a:pPr lvl="1"/>
+            <a:r>
+              <a:rPr lang="en-IN" dirty="0" smtClean="0"/>
+              <a:t>Previous research works</a:t>
+            </a:r>
+          </a:p>
+          <a:p>
+            <a:pPr lvl="1"/>
+            <a:r>
+              <a:rPr lang="en-IN" dirty="0" smtClean="0"/>
+              <a:t>Previous system</a:t>
+            </a:r>
+          </a:p>
+          <a:p>
+            <a:r>
+              <a:rPr lang="en-IN" dirty="0" smtClean="0"/>
+              <a:t>Structured dataset</a:t>
+            </a:r>
+          </a:p>
+          <a:p>
+            <a:pPr lvl="1"/>
+            <a:r>
+              <a:rPr lang="en-IN" dirty="0" smtClean="0"/>
+              <a:t>Previous research works</a:t>
+            </a:r>
+          </a:p>
+          <a:p>
+            <a:pPr lvl="1"/>
+            <a:r>
+              <a:rPr lang="en-IN" dirty="0" smtClean="0"/>
+              <a:t>Previous system</a:t>
+            </a:r>
+          </a:p>
+          <a:p>
+            <a:r>
+              <a:rPr lang="en-IN" dirty="0" err="1" smtClean="0"/>
+              <a:t>Bayes</a:t>
+            </a:r>
+            <a:r>
+              <a:rPr lang="en-IN" dirty="0" smtClean="0"/>
+              <a:t> error </a:t>
+            </a:r>
+          </a:p>
+          <a:p>
+            <a:pPr lvl="1"/>
+            <a:r>
+              <a:rPr lang="en-IN" dirty="0" smtClean="0"/>
+              <a:t>Irreducible error</a:t>
             </a:r>
             <a:endParaRPr lang="en-IN" dirty="0"/>
           </a:p>
@@ -4450,99 +4485,57 @@
         </p:nvSpPr>
         <p:spPr/>
         <p:txBody>
+          <a:bodyPr/>
+          <a:lstStyle/>
+          <a:p>
+            <a:r>
+              <a:rPr lang="en-IN" dirty="0" smtClean="0"/>
+              <a:t>Model-centric AI Development (1)</a:t>
+            </a:r>
+            <a:endParaRPr lang="en-IN" dirty="0"/>
+          </a:p>
+        </p:txBody>
+      </p:sp>
+      <p:sp>
+        <p:nvSpPr>
+          <p:cNvPr id="3" name="Content Placeholder 2"/>
+          <p:cNvSpPr>
+            <a:spLocks noGrp="1"/>
+          </p:cNvSpPr>
+          <p:nvPr>
+            <p:ph idx="1"/>
+          </p:nvPr>
+        </p:nvSpPr>
+        <p:spPr/>
+        <p:txBody>
           <a:bodyPr>
-            <a:normAutofit fontScale="90000"/>
+            <a:normAutofit/>
           </a:bodyPr>
           <a:lstStyle/>
           <a:p>
             <a:r>
               <a:rPr lang="en-IN" dirty="0" smtClean="0"/>
-              <a:t>Establish Baseline Model Performance</a:t>
-            </a:r>
-            <a:endParaRPr lang="en-IN" dirty="0"/>
-          </a:p>
-        </p:txBody>
-      </p:sp>
-      <p:sp>
-        <p:nvSpPr>
-          <p:cNvPr id="3" name="Content Placeholder 2"/>
-          <p:cNvSpPr>
-            <a:spLocks noGrp="1"/>
-          </p:cNvSpPr>
-          <p:nvPr>
-            <p:ph idx="1"/>
-          </p:nvPr>
-        </p:nvSpPr>
-        <p:spPr/>
-        <p:txBody>
-          <a:bodyPr>
-            <a:normAutofit lnSpcReduction="10000"/>
-          </a:bodyPr>
-          <a:lstStyle/>
-          <a:p>
-            <a:r>
-              <a:rPr lang="en-IN" dirty="0" smtClean="0"/>
-              <a:t>Unstructured dataset</a:t>
-            </a:r>
-          </a:p>
-          <a:p>
-            <a:pPr lvl="1"/>
-            <a:r>
-              <a:rPr lang="en-IN" dirty="0" smtClean="0"/>
-              <a:t>Human Level Performance</a:t>
-            </a:r>
-          </a:p>
-          <a:p>
-            <a:pPr lvl="1"/>
-            <a:r>
-              <a:rPr lang="en-IN" dirty="0" smtClean="0"/>
-              <a:t>Previous research works</a:t>
-            </a:r>
-          </a:p>
-          <a:p>
-            <a:pPr lvl="1"/>
-            <a:r>
-              <a:rPr lang="en-IN" dirty="0" smtClean="0"/>
-              <a:t>Previous system</a:t>
-            </a:r>
-          </a:p>
-          <a:p>
-            <a:r>
-              <a:rPr lang="en-IN" dirty="0" smtClean="0"/>
-              <a:t>Structured dataset</a:t>
-            </a:r>
-          </a:p>
-          <a:p>
-            <a:pPr lvl="1"/>
-            <a:r>
-              <a:rPr lang="en-IN" dirty="0" smtClean="0"/>
-              <a:t>Previous research works</a:t>
-            </a:r>
-          </a:p>
-          <a:p>
-            <a:pPr lvl="1"/>
-            <a:r>
-              <a:rPr lang="en-IN" dirty="0" smtClean="0"/>
-              <a:t>Previous system</a:t>
-            </a:r>
-          </a:p>
-          <a:p>
-            <a:r>
-              <a:rPr lang="en-IN" dirty="0" err="1" smtClean="0"/>
-              <a:t>Bayes</a:t>
-            </a:r>
-            <a:r>
-              <a:rPr lang="en-IN" dirty="0" smtClean="0"/>
-              <a:t> error </a:t>
-            </a:r>
-          </a:p>
-          <a:p>
-            <a:pPr lvl="1"/>
-            <a:r>
-              <a:rPr lang="en-IN" dirty="0" smtClean="0"/>
-              <a:t>Irreducible error</a:t>
-            </a:r>
-            <a:endParaRPr lang="en-IN" dirty="0"/>
+              <a:t>Fix dataset </a:t>
+            </a:r>
+            <a:endParaRPr lang="en-IN" dirty="0" smtClean="0"/>
+          </a:p>
+          <a:p>
+            <a:r>
+              <a:rPr lang="en-IN" dirty="0" smtClean="0"/>
+              <a:t>Improve </a:t>
+            </a:r>
+            <a:r>
+              <a:rPr lang="en-IN" dirty="0" smtClean="0"/>
+              <a:t>model </a:t>
+            </a:r>
+            <a:endParaRPr lang="en-IN" dirty="0" smtClean="0"/>
+          </a:p>
+          <a:p>
+            <a:r>
+              <a:rPr lang="en-IN" dirty="0" smtClean="0"/>
+              <a:t>Improve performance</a:t>
+            </a:r>
+            <a:endParaRPr lang="en-IN" dirty="0" smtClean="0"/>
           </a:p>
         </p:txBody>
       </p:sp>
@@ -4595,7 +4588,11 @@
           <a:p>
             <a:r>
               <a:rPr lang="en-IN" dirty="0" smtClean="0"/>
-              <a:t>Model-centric AI Development (1)</a:t>
+              <a:t>Model-centric AI Development </a:t>
+            </a:r>
+            <a:r>
+              <a:rPr lang="en-IN" dirty="0" smtClean="0"/>
+              <a:t>(2)</a:t>
             </a:r>
             <a:endParaRPr lang="en-IN" dirty="0"/>
           </a:p>
@@ -4614,54 +4611,46 @@
         <p:spPr/>
         <p:txBody>
           <a:bodyPr>
-            <a:normAutofit lnSpcReduction="10000"/>
+            <a:normAutofit/>
           </a:bodyPr>
           <a:lstStyle/>
           <a:p>
             <a:r>
               <a:rPr lang="en-IN" dirty="0" smtClean="0"/>
-              <a:t>Fix dataset – Improve model – Improve performance</a:t>
-            </a:r>
-          </a:p>
-          <a:p>
-            <a:r>
-              <a:rPr lang="en-IN" dirty="0" smtClean="0"/>
-              <a:t>Train model</a:t>
-            </a:r>
-          </a:p>
-          <a:p>
-            <a:pPr lvl="1"/>
-            <a:r>
-              <a:rPr lang="en-IN" dirty="0" smtClean="0"/>
-              <a:t>Over fit on training dataset - Low training error - Low bias</a:t>
-            </a:r>
-          </a:p>
-          <a:p>
-            <a:r>
-              <a:rPr lang="en-IN" dirty="0" smtClean="0"/>
-              <a:t>Evaluate trained model</a:t>
-            </a:r>
-          </a:p>
-          <a:p>
-            <a:pPr lvl="1"/>
-            <a:r>
-              <a:rPr lang="en-IN" dirty="0" smtClean="0"/>
-              <a:t>Evaluate on validation and test dataset </a:t>
-            </a:r>
-          </a:p>
-          <a:p>
-            <a:pPr lvl="1"/>
-            <a:r>
-              <a:rPr lang="en-IN" dirty="0" smtClean="0"/>
-              <a:t>Low validation or testing error </a:t>
-            </a:r>
-          </a:p>
-          <a:p>
-            <a:pPr lvl="1"/>
-            <a:r>
-              <a:rPr lang="en-IN" dirty="0" smtClean="0"/>
-              <a:t>Low variance</a:t>
-            </a:r>
+              <a:t>Train </a:t>
+            </a:r>
+            <a:r>
+              <a:rPr lang="en-IN" dirty="0" smtClean="0"/>
+              <a:t>model</a:t>
+            </a:r>
+          </a:p>
+          <a:p>
+            <a:pPr lvl="1"/>
+            <a:r>
+              <a:rPr lang="en-IN" dirty="0" smtClean="0"/>
+              <a:t>Over fit on training dataset </a:t>
+            </a:r>
+            <a:endParaRPr lang="en-IN" dirty="0" smtClean="0"/>
+          </a:p>
+          <a:p>
+            <a:pPr lvl="1"/>
+            <a:r>
+              <a:rPr lang="en-IN" dirty="0" smtClean="0"/>
+              <a:t>Low </a:t>
+            </a:r>
+            <a:r>
+              <a:rPr lang="en-IN" dirty="0" smtClean="0"/>
+              <a:t>training error </a:t>
+            </a:r>
+            <a:endParaRPr lang="en-IN" dirty="0" smtClean="0"/>
+          </a:p>
+          <a:p>
+            <a:pPr lvl="1"/>
+            <a:r>
+              <a:rPr lang="en-IN" dirty="0" smtClean="0"/>
+              <a:t>Low bias</a:t>
+            </a:r>
+            <a:endParaRPr lang="en-IN" dirty="0" smtClean="0"/>
           </a:p>
         </p:txBody>
       </p:sp>
@@ -4714,7 +4703,11 @@
           <a:p>
             <a:r>
               <a:rPr lang="en-IN" dirty="0" smtClean="0"/>
-              <a:t>Model-centric AI Development (2)</a:t>
+              <a:t>Model-centric AI Development </a:t>
+            </a:r>
+            <a:r>
+              <a:rPr lang="en-IN" dirty="0" smtClean="0"/>
+              <a:t>(3)</a:t>
             </a:r>
             <a:endParaRPr lang="en-IN" dirty="0"/>
           </a:p>
@@ -4739,35 +4732,52 @@
           <a:p>
             <a:r>
               <a:rPr lang="en-IN" dirty="0" smtClean="0"/>
-              <a:t>Validate trained model</a:t>
-            </a:r>
-          </a:p>
-          <a:p>
-            <a:pPr lvl="1"/>
-            <a:r>
-              <a:rPr lang="en-IN" dirty="0" smtClean="0"/>
-              <a:t>Evaluate model on multiple test datasets</a:t>
-            </a:r>
-          </a:p>
-          <a:p>
-            <a:pPr lvl="1"/>
-            <a:r>
-              <a:rPr lang="en-IN" dirty="0" smtClean="0"/>
-              <a:t>Evaluate model on business metrics</a:t>
-            </a:r>
-          </a:p>
-          <a:p>
-            <a:r>
-              <a:rPr lang="en-IN" dirty="0" smtClean="0"/>
-              <a:t>Perform error analysis</a:t>
-            </a:r>
-          </a:p>
-          <a:p>
-            <a:r>
-              <a:rPr lang="en-IN" dirty="0" smtClean="0"/>
-              <a:t>Test validated model using test dataset</a:t>
-            </a:r>
-            <a:endParaRPr lang="en-IN" dirty="0"/>
+              <a:t>Evaluate </a:t>
+            </a:r>
+            <a:r>
+              <a:rPr lang="en-IN" dirty="0" smtClean="0"/>
+              <a:t>trained model</a:t>
+            </a:r>
+          </a:p>
+          <a:p>
+            <a:pPr lvl="1"/>
+            <a:r>
+              <a:rPr lang="en-IN" dirty="0" smtClean="0"/>
+              <a:t>Evaluate on validation </a:t>
+            </a:r>
+            <a:r>
+              <a:rPr lang="en-IN" dirty="0" smtClean="0"/>
+              <a:t>dataset</a:t>
+            </a:r>
+          </a:p>
+          <a:p>
+            <a:pPr lvl="1"/>
+            <a:r>
+              <a:rPr lang="en-IN" dirty="0" smtClean="0"/>
+              <a:t>Evaluate on </a:t>
+            </a:r>
+            <a:r>
+              <a:rPr lang="en-IN" dirty="0" smtClean="0"/>
+              <a:t>test </a:t>
+            </a:r>
+            <a:r>
+              <a:rPr lang="en-IN" dirty="0" smtClean="0"/>
+              <a:t>dataset </a:t>
+            </a:r>
+          </a:p>
+          <a:p>
+            <a:pPr lvl="1"/>
+            <a:r>
+              <a:rPr lang="en-IN" dirty="0" smtClean="0"/>
+              <a:t>Low validation or testing error </a:t>
+            </a:r>
+          </a:p>
+          <a:p>
+            <a:pPr lvl="1"/>
+            <a:r>
+              <a:rPr lang="en-IN" dirty="0" smtClean="0"/>
+              <a:t>Low variance</a:t>
+            </a:r>
           </a:p>
         </p:txBody>
       </p:sp>
@@ -4820,7 +4830,11 @@
           <a:p>
             <a:r>
               <a:rPr lang="en-IN" dirty="0" smtClean="0"/>
-              <a:t>Data-centric AI Development</a:t>
+              <a:t>Model-centric AI Development </a:t>
+            </a:r>
+            <a:r>
+              <a:rPr lang="en-IN" dirty="0" smtClean="0"/>
+              <a:t>(4)</a:t>
             </a:r>
             <a:endParaRPr lang="en-IN" dirty="0"/>
           </a:p>
@@ -4839,58 +4853,39 @@
         <p:spPr/>
         <p:txBody>
           <a:bodyPr>
-            <a:normAutofit lnSpcReduction="10000"/>
+            <a:normAutofit/>
           </a:bodyPr>
           <a:lstStyle/>
           <a:p>
             <a:r>
               <a:rPr lang="en-IN" dirty="0" smtClean="0"/>
-              <a:t>Fix model – Improve dataset – Improve  performance</a:t>
-            </a:r>
-          </a:p>
-          <a:p>
-            <a:r>
-              <a:rPr lang="en-IN" dirty="0" smtClean="0"/>
-              <a:t>Multiple test datasets </a:t>
-            </a:r>
-          </a:p>
-          <a:p>
-            <a:pPr lvl="1"/>
-            <a:r>
-              <a:rPr lang="en-IN" dirty="0" smtClean="0"/>
-              <a:t>Compare performance with base-line model </a:t>
-            </a:r>
-          </a:p>
-          <a:p>
-            <a:pPr lvl="1"/>
-            <a:r>
-              <a:rPr lang="en-IN" dirty="0" smtClean="0"/>
-              <a:t>Add more training data </a:t>
-            </a:r>
-          </a:p>
-          <a:p>
-            <a:pPr lvl="1"/>
-            <a:r>
-              <a:rPr lang="en-IN" dirty="0" smtClean="0"/>
-              <a:t>Improve performance</a:t>
-            </a:r>
-          </a:p>
-          <a:p>
-            <a:r>
-              <a:rPr lang="en-IN" dirty="0" smtClean="0"/>
-              <a:t>From big dataset to good dataset</a:t>
-            </a:r>
-          </a:p>
-          <a:p>
-            <a:r>
-              <a:rPr lang="en-IN" dirty="0" smtClean="0"/>
-              <a:t>Data augmentation – Unstructured dataset</a:t>
-            </a:r>
-          </a:p>
-          <a:p>
-            <a:r>
-              <a:rPr lang="en-IN" dirty="0" smtClean="0"/>
-              <a:t>Feature engineering – Structured dataset</a:t>
+              <a:t>Validate trained model</a:t>
+            </a:r>
+          </a:p>
+          <a:p>
+            <a:pPr lvl="1"/>
+            <a:r>
+              <a:rPr lang="en-IN" dirty="0" smtClean="0"/>
+              <a:t>Evaluate model on multiple test datasets</a:t>
+            </a:r>
+          </a:p>
+          <a:p>
+            <a:pPr lvl="1"/>
+            <a:r>
+              <a:rPr lang="en-IN" dirty="0" smtClean="0"/>
+              <a:t>Evaluate model on business metrics</a:t>
+            </a:r>
+          </a:p>
+          <a:p>
+            <a:r>
+              <a:rPr lang="en-IN" dirty="0" smtClean="0"/>
+              <a:t>Perform error analysis</a:t>
+            </a:r>
+          </a:p>
+          <a:p>
+            <a:r>
+              <a:rPr lang="en-IN" dirty="0" smtClean="0"/>
+              <a:t>Test validated model using test dataset</a:t>
             </a:r>
             <a:endParaRPr lang="en-IN" dirty="0"/>
           </a:p>
@@ -4945,7 +4940,11 @@
           <a:p>
             <a:r>
               <a:rPr lang="en-IN" dirty="0" smtClean="0"/>
-              <a:t>Deployment</a:t>
+              <a:t>Data-centric AI </a:t>
+            </a:r>
+            <a:r>
+              <a:rPr lang="en-IN" dirty="0" smtClean="0"/>
+              <a:t>Development (1)</a:t>
             </a:r>
             <a:endParaRPr lang="en-IN" dirty="0"/>
           </a:p>
@@ -4963,31 +4962,39 @@
         </p:nvSpPr>
         <p:spPr/>
         <p:txBody>
-          <a:bodyPr/>
-          <a:lstStyle/>
-          <a:p>
-            <a:r>
-              <a:rPr lang="en-IN" dirty="0" smtClean="0"/>
-              <a:t>Post training optimization</a:t>
-            </a:r>
-          </a:p>
-          <a:p>
-            <a:r>
-              <a:rPr lang="en-IN" dirty="0" smtClean="0"/>
-              <a:t>Deploy model</a:t>
-            </a:r>
-          </a:p>
-          <a:p>
-            <a:r>
-              <a:rPr lang="en-IN" dirty="0" smtClean="0"/>
-              <a:t>Monitor model performance</a:t>
-            </a:r>
-          </a:p>
-          <a:p>
-            <a:r>
-              <a:rPr lang="en-IN" dirty="0" smtClean="0"/>
-              <a:t>Maintain model performance</a:t>
-            </a:r>
+          <a:bodyPr>
+            <a:normAutofit/>
+          </a:bodyPr>
+          <a:lstStyle/>
+          <a:p>
+            <a:r>
+              <a:rPr lang="en-IN" dirty="0" smtClean="0"/>
+              <a:t>Fix model </a:t>
+            </a:r>
+            <a:endParaRPr lang="en-IN" dirty="0" smtClean="0"/>
+          </a:p>
+          <a:p>
+            <a:r>
+              <a:rPr lang="en-IN" dirty="0" smtClean="0"/>
+              <a:t>Improve </a:t>
+            </a:r>
+            <a:r>
+              <a:rPr lang="en-IN" dirty="0" smtClean="0"/>
+              <a:t>dataset </a:t>
+            </a:r>
+            <a:endParaRPr lang="en-IN" dirty="0" smtClean="0"/>
+          </a:p>
+          <a:p>
+            <a:r>
+              <a:rPr lang="en-IN" dirty="0" smtClean="0"/>
+              <a:t>Improve  </a:t>
+            </a:r>
+            <a:r>
+              <a:rPr lang="en-IN" dirty="0" smtClean="0"/>
+              <a:t>performance</a:t>
+            </a:r>
+          </a:p>
+          <a:p>
             <a:endParaRPr lang="en-IN" dirty="0"/>
           </a:p>
         </p:txBody>
@@ -5041,7 +5048,11 @@
           <a:p>
             <a:r>
               <a:rPr lang="en-IN" dirty="0" smtClean="0"/>
-              <a:t>Post Training Optimization</a:t>
+              <a:t>Data-centric AI </a:t>
+            </a:r>
+            <a:r>
+              <a:rPr lang="en-IN" dirty="0" smtClean="0"/>
+              <a:t>Development (2)</a:t>
             </a:r>
             <a:endParaRPr lang="en-IN" dirty="0"/>
           </a:p>
@@ -5059,24 +5070,43 @@
         </p:nvSpPr>
         <p:spPr/>
         <p:txBody>
-          <a:bodyPr/>
-          <a:lstStyle/>
-          <a:p>
-            <a:r>
-              <a:rPr lang="en-IN" dirty="0" smtClean="0"/>
-              <a:t>Hardware level optimization</a:t>
-            </a:r>
-          </a:p>
-          <a:p>
-            <a:r>
-              <a:rPr lang="en-IN" dirty="0" smtClean="0"/>
-              <a:t>Software level optimization</a:t>
-            </a:r>
-          </a:p>
-          <a:p>
-            <a:r>
-              <a:rPr lang="en-IN" dirty="0" smtClean="0"/>
-              <a:t>Algorithm level optimization</a:t>
+          <a:bodyPr>
+            <a:normAutofit/>
+          </a:bodyPr>
+          <a:lstStyle/>
+          <a:p>
+            <a:r>
+              <a:rPr lang="en-IN" dirty="0" smtClean="0"/>
+              <a:t>Multiple </a:t>
+            </a:r>
+            <a:r>
+              <a:rPr lang="en-IN" dirty="0" smtClean="0"/>
+              <a:t>test datasets </a:t>
+            </a:r>
+          </a:p>
+          <a:p>
+            <a:pPr lvl="1"/>
+            <a:r>
+              <a:rPr lang="en-IN" dirty="0" smtClean="0"/>
+              <a:t>Compare performance with base-line model </a:t>
+            </a:r>
+          </a:p>
+          <a:p>
+            <a:pPr lvl="1"/>
+            <a:r>
+              <a:rPr lang="en-IN" dirty="0" smtClean="0"/>
+              <a:t>Add more training data </a:t>
+            </a:r>
+          </a:p>
+          <a:p>
+            <a:pPr lvl="1"/>
+            <a:r>
+              <a:rPr lang="en-IN" dirty="0" smtClean="0"/>
+              <a:t>Improve </a:t>
+            </a:r>
+            <a:r>
+              <a:rPr lang="en-IN" dirty="0" smtClean="0"/>
+              <a:t>performance</a:t>
             </a:r>
             <a:endParaRPr lang="en-IN" dirty="0"/>
           </a:p>
@@ -5131,7 +5161,11 @@
           <a:p>
             <a:r>
               <a:rPr lang="en-IN" dirty="0" smtClean="0"/>
-              <a:t>Hardware Level Optimization</a:t>
+              <a:t>Data-centric AI </a:t>
+            </a:r>
+            <a:r>
+              <a:rPr lang="en-IN" dirty="0" smtClean="0"/>
+              <a:t>Development (3)</a:t>
             </a:r>
             <a:endParaRPr lang="en-IN" dirty="0"/>
           </a:p>
@@ -5149,30 +5183,54 @@
         </p:nvSpPr>
         <p:spPr/>
         <p:txBody>
-          <a:bodyPr/>
-          <a:lstStyle/>
-          <a:p>
-            <a:r>
-              <a:rPr lang="it-IT" dirty="0" smtClean="0"/>
-              <a:t>Edge AI</a:t>
-            </a:r>
-          </a:p>
-          <a:p>
-            <a:r>
-              <a:rPr lang="it-IT" dirty="0" smtClean="0"/>
-              <a:t>CPU</a:t>
-            </a:r>
-          </a:p>
-          <a:p>
-            <a:r>
-              <a:rPr lang="it-IT" dirty="0" smtClean="0"/>
-              <a:t>GPU</a:t>
-            </a:r>
-          </a:p>
-          <a:p>
-            <a:r>
-              <a:rPr lang="it-IT" dirty="0" smtClean="0"/>
-              <a:t>TPU</a:t>
+          <a:bodyPr>
+            <a:normAutofit/>
+          </a:bodyPr>
+          <a:lstStyle/>
+          <a:p>
+            <a:r>
+              <a:rPr lang="en-IN" dirty="0" smtClean="0"/>
+              <a:t>From </a:t>
+            </a:r>
+            <a:r>
+              <a:rPr lang="en-IN" dirty="0" smtClean="0"/>
+              <a:t>big dataset to good dataset</a:t>
+            </a:r>
+          </a:p>
+          <a:p>
+            <a:r>
+              <a:rPr lang="en-IN" dirty="0" smtClean="0"/>
+              <a:t>Data augmentation </a:t>
+            </a:r>
+            <a:endParaRPr lang="en-IN" dirty="0" smtClean="0"/>
+          </a:p>
+          <a:p>
+            <a:pPr lvl="1"/>
+            <a:r>
+              <a:rPr lang="en-IN" dirty="0" smtClean="0"/>
+              <a:t>Unstructured </a:t>
+            </a:r>
+            <a:r>
+              <a:rPr lang="en-IN" dirty="0" smtClean="0"/>
+              <a:t>dataset</a:t>
+            </a:r>
+          </a:p>
+          <a:p>
+            <a:r>
+              <a:rPr lang="en-IN" dirty="0" smtClean="0"/>
+              <a:t>Feature engineering </a:t>
+            </a:r>
+            <a:endParaRPr lang="en-IN" dirty="0" smtClean="0"/>
+          </a:p>
+          <a:p>
+            <a:pPr lvl="1"/>
+            <a:r>
+              <a:rPr lang="en-IN" dirty="0" smtClean="0"/>
+              <a:t>Structured </a:t>
+            </a:r>
+            <a:r>
+              <a:rPr lang="en-IN" dirty="0" smtClean="0"/>
+              <a:t>dataset</a:t>
             </a:r>
             <a:endParaRPr lang="en-IN" dirty="0"/>
           </a:p>
@@ -5227,7 +5285,7 @@
           <a:p>
             <a:r>
               <a:rPr lang="en-IN" dirty="0" smtClean="0"/>
-              <a:t>Software Level Optimization</a:t>
+              <a:t>Deployment</a:t>
             </a:r>
             <a:endParaRPr lang="en-IN" dirty="0"/>
           </a:p>
@@ -5250,48 +5308,26 @@
           <a:p>
             <a:r>
               <a:rPr lang="en-IN" dirty="0" smtClean="0"/>
-              <a:t>Target optimized libraries </a:t>
-            </a:r>
-          </a:p>
-          <a:p>
-            <a:pPr lvl="1"/>
-            <a:r>
-              <a:rPr lang="en-IN" dirty="0" smtClean="0"/>
-              <a:t>NVIDIA </a:t>
-            </a:r>
-            <a:r>
-              <a:rPr lang="en-IN" dirty="0" err="1" smtClean="0"/>
-              <a:t>cuDNN</a:t>
-            </a:r>
-            <a:endParaRPr lang="en-IN" dirty="0" smtClean="0"/>
-          </a:p>
-          <a:p>
-            <a:r>
-              <a:rPr lang="en-IN" dirty="0" smtClean="0"/>
-              <a:t>Deep learning compilers </a:t>
-            </a:r>
-          </a:p>
-          <a:p>
-            <a:pPr lvl="1"/>
-            <a:r>
-              <a:rPr lang="en-IN" dirty="0" smtClean="0"/>
-              <a:t>NVIDIA </a:t>
-            </a:r>
-            <a:r>
-              <a:rPr lang="en-IN" dirty="0" err="1" smtClean="0"/>
-              <a:t>TensorRT</a:t>
-            </a:r>
-            <a:endParaRPr lang="en-IN" dirty="0" smtClean="0"/>
-          </a:p>
-          <a:p>
-            <a:pPr lvl="1"/>
-            <a:r>
-              <a:rPr lang="en-IN" dirty="0" smtClean="0"/>
-              <a:t>OpenCV-DNN</a:t>
-            </a:r>
-          </a:p>
-          <a:p>
-            <a:pPr lvl="1"/>
+              <a:t>Post training optimization</a:t>
+            </a:r>
+          </a:p>
+          <a:p>
+            <a:r>
+              <a:rPr lang="en-IN" dirty="0" smtClean="0"/>
+              <a:t>Deploy model</a:t>
+            </a:r>
+          </a:p>
+          <a:p>
+            <a:r>
+              <a:rPr lang="en-IN" dirty="0" smtClean="0"/>
+              <a:t>Monitor model performance</a:t>
+            </a:r>
+          </a:p>
+          <a:p>
+            <a:r>
+              <a:rPr lang="en-IN" dirty="0" smtClean="0"/>
+              <a:t>Maintain model performance</a:t>
+            </a:r>
             <a:endParaRPr lang="en-IN" dirty="0"/>
           </a:p>
         </p:txBody>
@@ -5345,7 +5381,7 @@
           <a:p>
             <a:r>
               <a:rPr lang="en-IN" dirty="0" smtClean="0"/>
-              <a:t>Algorithm Level Optimization</a:t>
+              <a:t>Post Training Optimization</a:t>
             </a:r>
             <a:endParaRPr lang="en-IN" dirty="0"/>
           </a:p>
@@ -5368,55 +5404,19 @@
           <a:p>
             <a:r>
               <a:rPr lang="en-IN" dirty="0" smtClean="0"/>
-              <a:t>Pruning </a:t>
-            </a:r>
-          </a:p>
-          <a:p>
-            <a:pPr lvl="1"/>
-            <a:r>
-              <a:rPr lang="en-IN" dirty="0" smtClean="0"/>
-              <a:t>Remove model parameters</a:t>
-            </a:r>
-          </a:p>
-          <a:p>
-            <a:pPr lvl="1"/>
-            <a:r>
-              <a:rPr lang="en-IN" dirty="0" smtClean="0"/>
-              <a:t>Remove 80% parameters</a:t>
-            </a:r>
-          </a:p>
-          <a:p>
-            <a:pPr lvl="1"/>
-            <a:r>
-              <a:rPr lang="en-IN" dirty="0" smtClean="0"/>
-              <a:t>1.5% reduction in accuracy</a:t>
-            </a:r>
-          </a:p>
-          <a:p>
-            <a:pPr lvl="1"/>
-            <a:r>
-              <a:rPr lang="en-IN" dirty="0" smtClean="0"/>
-              <a:t>Retraining to improve performance</a:t>
-            </a:r>
-          </a:p>
-          <a:p>
-            <a:r>
-              <a:rPr lang="en-IN" dirty="0" smtClean="0"/>
-              <a:t>Quantization </a:t>
-            </a:r>
-          </a:p>
-          <a:p>
-            <a:pPr lvl="1"/>
-            <a:r>
-              <a:rPr lang="en-IN" dirty="0" smtClean="0"/>
-              <a:t>Convert weights to lower precision</a:t>
-            </a:r>
-          </a:p>
-          <a:p>
-            <a:pPr lvl="1"/>
-            <a:r>
-              <a:rPr lang="en-IN" dirty="0" smtClean="0"/>
-              <a:t>Float16, int16, or int8</a:t>
+              <a:t>Hardware level optimization</a:t>
+            </a:r>
+          </a:p>
+          <a:p>
+            <a:r>
+              <a:rPr lang="en-IN" dirty="0" smtClean="0"/>
+              <a:t>Software level optimization</a:t>
+            </a:r>
+          </a:p>
+          <a:p>
+            <a:r>
+              <a:rPr lang="en-IN" dirty="0" smtClean="0"/>
+              <a:t>Algorithm level optimization</a:t>
             </a:r>
             <a:endParaRPr lang="en-IN" dirty="0"/>
           </a:p>
@@ -5471,7 +5471,7 @@
           <a:p>
             <a:r>
               <a:rPr lang="en-IN" dirty="0" smtClean="0"/>
-              <a:t>Deploy Model</a:t>
+              <a:t>Hardware Level Optimization</a:t>
             </a:r>
             <a:endParaRPr lang="en-IN" dirty="0"/>
           </a:p>
@@ -5489,72 +5489,30 @@
         </p:nvSpPr>
         <p:spPr/>
         <p:txBody>
-          <a:bodyPr>
-            <a:normAutofit fontScale="92500" lnSpcReduction="20000"/>
-          </a:bodyPr>
-          <a:lstStyle/>
-          <a:p>
-            <a:r>
-              <a:rPr lang="en-IN" dirty="0" smtClean="0"/>
-              <a:t>Predict and Infer</a:t>
-            </a:r>
-          </a:p>
-          <a:p>
-            <a:r>
-              <a:rPr lang="en-IN" dirty="0" smtClean="0"/>
-              <a:t>Cloud AI</a:t>
-            </a:r>
-          </a:p>
-          <a:p>
-            <a:r>
-              <a:rPr lang="en-IN" dirty="0" smtClean="0"/>
+          <a:bodyPr/>
+          <a:lstStyle/>
+          <a:p>
+            <a:r>
+              <a:rPr lang="it-IT" dirty="0" smtClean="0"/>
               <a:t>Edge AI</a:t>
             </a:r>
           </a:p>
           <a:p>
             <a:r>
-              <a:rPr lang="en-IN" dirty="0" smtClean="0"/>
-              <a:t>On premises</a:t>
-            </a:r>
-          </a:p>
-          <a:p>
-            <a:r>
-              <a:rPr lang="en-IN" dirty="0" smtClean="0"/>
-              <a:t>Online prediction </a:t>
-            </a:r>
-          </a:p>
-          <a:p>
-            <a:pPr lvl="1"/>
-            <a:r>
-              <a:rPr lang="en-IN" dirty="0" smtClean="0"/>
-              <a:t>Less latency</a:t>
-            </a:r>
-          </a:p>
-          <a:p>
-            <a:r>
-              <a:rPr lang="en-IN" dirty="0" smtClean="0"/>
-              <a:t>Batch prediction </a:t>
-            </a:r>
-          </a:p>
-          <a:p>
-            <a:pPr lvl="1"/>
-            <a:r>
-              <a:rPr lang="en-IN" dirty="0" smtClean="0"/>
-              <a:t>Offline prediction </a:t>
-            </a:r>
-          </a:p>
-          <a:p>
-            <a:pPr lvl="1"/>
-            <a:r>
-              <a:rPr lang="en-IN" dirty="0" smtClean="0"/>
-              <a:t>Large dataset </a:t>
-            </a:r>
-          </a:p>
-          <a:p>
-            <a:pPr lvl="1"/>
-            <a:r>
-              <a:rPr lang="en-IN" dirty="0" smtClean="0"/>
-              <a:t>Offline dataset</a:t>
+              <a:rPr lang="it-IT" dirty="0" smtClean="0"/>
+              <a:t>CPU</a:t>
+            </a:r>
+          </a:p>
+          <a:p>
+            <a:r>
+              <a:rPr lang="it-IT" dirty="0" smtClean="0"/>
+              <a:t>GPU</a:t>
+            </a:r>
+          </a:p>
+          <a:p>
+            <a:r>
+              <a:rPr lang="it-IT" dirty="0" smtClean="0"/>
+              <a:t>TPU</a:t>
             </a:r>
             <a:endParaRPr lang="en-IN" dirty="0"/>
           </a:p>
@@ -5609,7 +5567,7 @@
           <a:p>
             <a:r>
               <a:rPr lang="en-IN" dirty="0" smtClean="0"/>
-              <a:t>Machine Learning Project Lifecycle</a:t>
+              <a:t>Project Scoping</a:t>
             </a:r>
             <a:endParaRPr lang="en-IN" dirty="0"/>
           </a:p>
@@ -5632,25 +5590,46 @@
           <a:p>
             <a:r>
               <a:rPr lang="en-IN" dirty="0" smtClean="0"/>
-              <a:t>Project scoping</a:t>
-            </a:r>
-          </a:p>
-          <a:p>
-            <a:r>
-              <a:rPr lang="en-IN" dirty="0" smtClean="0"/>
-              <a:t>Dataset collection</a:t>
-            </a:r>
-          </a:p>
-          <a:p>
-            <a:r>
-              <a:rPr lang="en-IN" dirty="0" smtClean="0"/>
-              <a:t>Modelling</a:t>
-            </a:r>
-          </a:p>
-          <a:p>
-            <a:r>
-              <a:rPr lang="en-IN" dirty="0" smtClean="0"/>
-              <a:t>Deployment</a:t>
+              <a:t>Identify project</a:t>
+            </a:r>
+          </a:p>
+          <a:p>
+            <a:r>
+              <a:rPr lang="en-IN" dirty="0" smtClean="0"/>
+              <a:t>Determine milestones</a:t>
+            </a:r>
+          </a:p>
+          <a:p>
+            <a:r>
+              <a:rPr lang="en-IN" dirty="0" smtClean="0"/>
+              <a:t>Define metrics</a:t>
+            </a:r>
+          </a:p>
+          <a:p>
+            <a:r>
+              <a:rPr lang="en-IN" dirty="0" smtClean="0"/>
+              <a:t>Estimate resource requirement </a:t>
+            </a:r>
+          </a:p>
+          <a:p>
+            <a:pPr lvl="1"/>
+            <a:r>
+              <a:rPr lang="en-IN" dirty="0" smtClean="0"/>
+              <a:t>Data</a:t>
+            </a:r>
+          </a:p>
+          <a:p>
+            <a:pPr lvl="1"/>
+            <a:r>
+              <a:rPr lang="en-IN" dirty="0" smtClean="0"/>
+              <a:t>Time</a:t>
+            </a:r>
+          </a:p>
+          <a:p>
+            <a:pPr lvl="1"/>
+            <a:r>
+              <a:rPr lang="en-IN" dirty="0" smtClean="0"/>
+              <a:t>People</a:t>
             </a:r>
             <a:endParaRPr lang="en-IN" dirty="0"/>
           </a:p>
@@ -5705,7 +5684,7 @@
           <a:p>
             <a:r>
               <a:rPr lang="en-IN" dirty="0" smtClean="0"/>
-              <a:t>Cloud AI</a:t>
+              <a:t>Software Level Optimization</a:t>
             </a:r>
             <a:endParaRPr lang="en-IN" dirty="0"/>
           </a:p>
@@ -5728,20 +5707,48 @@
           <a:p>
             <a:r>
               <a:rPr lang="en-IN" dirty="0" smtClean="0"/>
-              <a:t>Infrastructure support</a:t>
-            </a:r>
-          </a:p>
-          <a:p>
-            <a:r>
-              <a:rPr lang="en-IN" dirty="0" smtClean="0"/>
-              <a:t>Scalability</a:t>
-            </a:r>
-          </a:p>
-          <a:p>
-            <a:r>
-              <a:rPr lang="en-IN" dirty="0" smtClean="0"/>
-              <a:t>Different services</a:t>
-            </a:r>
+              <a:t>Target optimized libraries </a:t>
+            </a:r>
+          </a:p>
+          <a:p>
+            <a:pPr lvl="1"/>
+            <a:r>
+              <a:rPr lang="en-IN" dirty="0" smtClean="0"/>
+              <a:t>NVIDIA </a:t>
+            </a:r>
+            <a:r>
+              <a:rPr lang="en-IN" dirty="0" err="1" smtClean="0"/>
+              <a:t>cuDNN</a:t>
+            </a:r>
+            <a:endParaRPr lang="en-IN" dirty="0" smtClean="0"/>
+          </a:p>
+          <a:p>
+            <a:r>
+              <a:rPr lang="en-IN" dirty="0" smtClean="0"/>
+              <a:t>Deep learning compilers </a:t>
+            </a:r>
+          </a:p>
+          <a:p>
+            <a:pPr lvl="1"/>
+            <a:r>
+              <a:rPr lang="en-IN" dirty="0" smtClean="0"/>
+              <a:t>NVIDIA </a:t>
+            </a:r>
+            <a:r>
+              <a:rPr lang="en-IN" dirty="0" err="1" smtClean="0"/>
+              <a:t>TensorRT</a:t>
+            </a:r>
+            <a:endParaRPr lang="en-IN" dirty="0" smtClean="0"/>
+          </a:p>
+          <a:p>
+            <a:pPr lvl="1"/>
+            <a:r>
+              <a:rPr lang="en-IN" dirty="0" smtClean="0"/>
+              <a:t>OpenCV-DNN</a:t>
+            </a:r>
+          </a:p>
+          <a:p>
+            <a:pPr lvl="1"/>
             <a:endParaRPr lang="en-IN" dirty="0"/>
           </a:p>
         </p:txBody>
@@ -5751,6 +5758,13 @@
   <p:clrMapOvr>
     <a:masterClrMapping/>
   </p:clrMapOvr>
+  <p:timing>
+    <p:tnLst>
+      <p:par>
+        <p:cTn id="1" dur="indefinite" restart="never" nodeType="tmRoot"/>
+      </p:par>
+    </p:tnLst>
+  </p:timing>
 </p:sld>
 </file>
 
@@ -5788,11 +5802,11 @@
           <a:p>
             <a:r>
               <a:rPr lang="en-IN" dirty="0" smtClean="0"/>
-              <a:t>Edge </a:t>
-            </a:r>
-            <a:r>
-              <a:rPr lang="en-IN" dirty="0" smtClean="0"/>
-              <a:t>AI (1)</a:t>
+              <a:t>Algorithm Level </a:t>
+            </a:r>
+            <a:r>
+              <a:rPr lang="en-IN" dirty="0" smtClean="0"/>
+              <a:t>Optimization (1)</a:t>
             </a:r>
             <a:endParaRPr lang="en-IN" dirty="0"/>
           </a:p>
@@ -5810,56 +5824,48 @@
         </p:nvSpPr>
         <p:spPr/>
         <p:txBody>
-          <a:bodyPr>
-            <a:normAutofit/>
-          </a:bodyPr>
-          <a:lstStyle/>
-          <a:p>
-            <a:r>
-              <a:rPr lang="en-IN" dirty="0" smtClean="0"/>
-              <a:t>Run AI algorithm locally at source</a:t>
-            </a:r>
-          </a:p>
-          <a:p>
-            <a:r>
-              <a:rPr lang="en-IN" dirty="0" smtClean="0"/>
-              <a:t>Hardware devices </a:t>
-            </a:r>
-            <a:r>
-              <a:rPr lang="en-IN" dirty="0" smtClean="0"/>
-              <a:t>– Edge devices</a:t>
-            </a:r>
-            <a:endParaRPr lang="en-IN" dirty="0" smtClean="0"/>
-          </a:p>
-          <a:p>
-            <a:r>
-              <a:rPr lang="en-IN" dirty="0" smtClean="0"/>
-              <a:t>Real </a:t>
-            </a:r>
-            <a:r>
-              <a:rPr lang="en-IN" dirty="0" smtClean="0"/>
-              <a:t>time decision making </a:t>
-            </a:r>
-            <a:endParaRPr lang="en-IN" dirty="0" smtClean="0"/>
-          </a:p>
-          <a:p>
-            <a:r>
-              <a:rPr lang="en-IN" dirty="0" smtClean="0"/>
-              <a:t>No </a:t>
-            </a:r>
-            <a:r>
-              <a:rPr lang="en-IN" dirty="0" smtClean="0"/>
-              <a:t>need for constant network </a:t>
-            </a:r>
-            <a:r>
-              <a:rPr lang="en-IN" dirty="0" smtClean="0"/>
-              <a:t>connectivity</a:t>
-            </a:r>
-          </a:p>
-          <a:p>
-            <a:r>
-              <a:rPr lang="en-IN" dirty="0" smtClean="0"/>
-              <a:t>Low or reduce latency</a:t>
+          <a:bodyPr/>
+          <a:lstStyle/>
+          <a:p>
+            <a:r>
+              <a:rPr lang="en-IN" dirty="0" smtClean="0"/>
+              <a:t>Pruning </a:t>
+            </a:r>
+          </a:p>
+          <a:p>
+            <a:pPr lvl="1"/>
+            <a:r>
+              <a:rPr lang="en-IN" dirty="0" smtClean="0"/>
+              <a:t>Remove model parameters</a:t>
+            </a:r>
+          </a:p>
+          <a:p>
+            <a:pPr lvl="1"/>
+            <a:r>
+              <a:rPr lang="en-IN" dirty="0" smtClean="0"/>
+              <a:t>Remove 80% parameters</a:t>
+            </a:r>
+          </a:p>
+          <a:p>
+            <a:pPr lvl="1"/>
+            <a:r>
+              <a:rPr lang="en-IN" dirty="0" smtClean="0"/>
+              <a:t>1.5% reduction in accuracy</a:t>
+            </a:r>
+          </a:p>
+          <a:p>
+            <a:pPr lvl="1"/>
+            <a:r>
+              <a:rPr lang="en-IN" dirty="0" smtClean="0"/>
+              <a:t>Retrain to </a:t>
+            </a:r>
+            <a:r>
+              <a:rPr lang="en-IN" dirty="0" smtClean="0"/>
+              <a:t>improve </a:t>
+            </a:r>
+            <a:r>
+              <a:rPr lang="en-IN" dirty="0" smtClean="0"/>
+              <a:t>performance</a:t>
             </a:r>
             <a:endParaRPr lang="en-IN" dirty="0" smtClean="0"/>
           </a:p>
@@ -5870,6 +5876,13 @@
   <p:clrMapOvr>
     <a:masterClrMapping/>
   </p:clrMapOvr>
+  <p:timing>
+    <p:tnLst>
+      <p:par>
+        <p:cTn id="1" dur="indefinite" restart="never" nodeType="tmRoot"/>
+      </p:par>
+    </p:tnLst>
+  </p:timing>
 </p:sld>
 </file>
 
@@ -5907,11 +5920,11 @@
           <a:p>
             <a:r>
               <a:rPr lang="en-IN" dirty="0" smtClean="0"/>
-              <a:t>Edge </a:t>
-            </a:r>
-            <a:r>
-              <a:rPr lang="en-IN" dirty="0" smtClean="0"/>
-              <a:t>AI (2)</a:t>
+              <a:t>Algorithm Level </a:t>
+            </a:r>
+            <a:r>
+              <a:rPr lang="en-IN" dirty="0" smtClean="0"/>
+              <a:t>Optimization (2)</a:t>
             </a:r>
             <a:endParaRPr lang="en-IN" dirty="0"/>
           </a:p>
@@ -5929,18 +5942,12 @@
         </p:nvSpPr>
         <p:spPr/>
         <p:txBody>
-          <a:bodyPr>
-            <a:normAutofit/>
-          </a:bodyPr>
-          <a:lstStyle/>
-          <a:p>
-            <a:r>
-              <a:rPr lang="en-IN" dirty="0" smtClean="0"/>
-              <a:t>Example </a:t>
-            </a:r>
-            <a:r>
-              <a:rPr lang="en-IN" dirty="0" smtClean="0"/>
-              <a:t>applications </a:t>
+          <a:bodyPr/>
+          <a:lstStyle/>
+          <a:p>
+            <a:r>
+              <a:rPr lang="en-IN" dirty="0" smtClean="0"/>
+              <a:t>Quantization </a:t>
             </a:r>
             <a:endParaRPr lang="en-IN" dirty="0" smtClean="0"/>
           </a:p>
@@ -5948,88 +5955,14 @@
             <a:pPr lvl="1"/>
             <a:r>
               <a:rPr lang="en-IN" dirty="0" smtClean="0"/>
-              <a:t>Autonomous </a:t>
-            </a:r>
-            <a:r>
-              <a:rPr lang="en-IN" dirty="0" smtClean="0"/>
-              <a:t>vehicles </a:t>
-            </a:r>
-            <a:r>
-              <a:rPr lang="en-IN" dirty="0" smtClean="0"/>
-              <a:t>- Low latency</a:t>
-            </a:r>
-            <a:endParaRPr lang="en-IN" dirty="0" smtClean="0"/>
-          </a:p>
-          <a:p>
-            <a:r>
-              <a:rPr lang="en-IN" dirty="0" smtClean="0"/>
-              <a:t>Example devices </a:t>
-            </a:r>
-            <a:endParaRPr lang="en-IN" dirty="0" smtClean="0"/>
-          </a:p>
-          <a:p>
-            <a:pPr lvl="1"/>
-            <a:r>
-              <a:rPr lang="en-IN" dirty="0" smtClean="0"/>
-              <a:t>NVIDIA </a:t>
-            </a:r>
-            <a:r>
-              <a:rPr lang="en-IN" dirty="0" err="1" smtClean="0"/>
-              <a:t>Jetson</a:t>
-            </a:r>
-            <a:r>
-              <a:rPr lang="en-IN" dirty="0" smtClean="0"/>
-              <a:t> </a:t>
-            </a:r>
-            <a:r>
-              <a:rPr lang="en-IN" dirty="0" err="1" smtClean="0"/>
-              <a:t>Nano</a:t>
-            </a:r>
-            <a:endParaRPr lang="en-IN" dirty="0" smtClean="0"/>
-          </a:p>
-          <a:p>
-            <a:pPr lvl="1"/>
-            <a:r>
-              <a:rPr lang="en-IN" dirty="0" smtClean="0"/>
-              <a:t>NVIDIA </a:t>
-            </a:r>
-            <a:r>
-              <a:rPr lang="en-IN" dirty="0" err="1" smtClean="0"/>
-              <a:t>Jetson</a:t>
-            </a:r>
-            <a:r>
-              <a:rPr lang="en-IN" dirty="0" smtClean="0"/>
-              <a:t> </a:t>
-            </a:r>
-            <a:r>
-              <a:rPr lang="en-IN" dirty="0" smtClean="0"/>
-              <a:t>Xavier</a:t>
-            </a:r>
-          </a:p>
-          <a:p>
-            <a:pPr lvl="1"/>
-            <a:r>
-              <a:rPr lang="en-IN" dirty="0" smtClean="0"/>
-              <a:t>Raspberry </a:t>
-            </a:r>
-            <a:r>
-              <a:rPr lang="en-IN" dirty="0" smtClean="0"/>
-              <a:t>Pi </a:t>
-            </a:r>
-            <a:r>
-              <a:rPr lang="en-IN" dirty="0" smtClean="0"/>
-              <a:t>4</a:t>
-            </a:r>
-          </a:p>
-          <a:p>
-            <a:pPr lvl="1"/>
-            <a:r>
-              <a:rPr lang="en-IN" dirty="0" smtClean="0"/>
-              <a:t>Intel </a:t>
-            </a:r>
-            <a:r>
-              <a:rPr lang="en-IN" dirty="0" err="1" smtClean="0"/>
-              <a:t>Movidius</a:t>
+              <a:t>Convert weights to lower precision</a:t>
+            </a:r>
+          </a:p>
+          <a:p>
+            <a:pPr lvl="1"/>
+            <a:r>
+              <a:rPr lang="en-IN" dirty="0" smtClean="0"/>
+              <a:t>Float16, int16, or int8</a:t>
             </a:r>
             <a:endParaRPr lang="en-IN" dirty="0"/>
           </a:p>
@@ -6040,6 +5973,13 @@
   <p:clrMapOvr>
     <a:masterClrMapping/>
   </p:clrMapOvr>
+  <p:timing>
+    <p:tnLst>
+      <p:par>
+        <p:cTn id="1" dur="indefinite" restart="never" nodeType="tmRoot"/>
+      </p:par>
+    </p:tnLst>
+  </p:timing>
 </p:sld>
 </file>
 
@@ -6077,21 +6017,9 @@
           <a:p>
             <a:r>
               <a:rPr lang="en-IN" dirty="0" smtClean="0"/>
-              <a:t>NVIDIA </a:t>
-            </a:r>
-            <a:r>
-              <a:rPr lang="en-IN" dirty="0" err="1" smtClean="0"/>
-              <a:t>Jetson</a:t>
-            </a:r>
-            <a:r>
-              <a:rPr lang="en-IN" dirty="0" smtClean="0"/>
-              <a:t> </a:t>
-            </a:r>
-            <a:r>
-              <a:rPr lang="en-IN" dirty="0" err="1" smtClean="0"/>
-              <a:t>Nano</a:t>
-            </a:r>
-            <a:endParaRPr lang="en-IN" dirty="0" smtClean="0"/>
+              <a:t>Deploy Model</a:t>
+            </a:r>
+            <a:endParaRPr lang="en-IN" dirty="0"/>
           </a:p>
         </p:txBody>
       </p:sp>
@@ -6107,71 +6035,72 @@
         </p:nvSpPr>
         <p:spPr/>
         <p:txBody>
-          <a:bodyPr/>
-          <a:lstStyle/>
-          <a:p>
-            <a:r>
-              <a:rPr lang="en-IN" dirty="0" smtClean="0"/>
-              <a:t>GPU</a:t>
-            </a:r>
-          </a:p>
-          <a:p>
-            <a:pPr lvl="1"/>
-            <a:r>
-              <a:rPr lang="en-IN" dirty="0" smtClean="0"/>
-              <a:t>NVIDIA </a:t>
-            </a:r>
-            <a:r>
-              <a:rPr lang="en-IN" dirty="0" smtClean="0"/>
-              <a:t>Maxwell architecture </a:t>
-            </a:r>
-            <a:endParaRPr lang="en-IN" dirty="0" smtClean="0"/>
-          </a:p>
-          <a:p>
-            <a:pPr lvl="1"/>
-            <a:r>
-              <a:rPr lang="en-IN" dirty="0" smtClean="0"/>
-              <a:t>128 </a:t>
-            </a:r>
-            <a:r>
-              <a:rPr lang="en-IN" dirty="0" smtClean="0"/>
-              <a:t>NVIDIA CUDA cores</a:t>
-            </a:r>
-          </a:p>
-          <a:p>
-            <a:r>
-              <a:rPr lang="en-IN" dirty="0" smtClean="0"/>
-              <a:t>CPU </a:t>
-            </a:r>
-            <a:endParaRPr lang="en-IN" dirty="0" smtClean="0"/>
-          </a:p>
-          <a:p>
-            <a:pPr lvl="1"/>
-            <a:r>
-              <a:rPr lang="en-IN" dirty="0" smtClean="0"/>
-              <a:t>Quad </a:t>
-            </a:r>
-            <a:r>
-              <a:rPr lang="en-IN" dirty="0" smtClean="0"/>
-              <a:t>core ARM Cortex</a:t>
-            </a:r>
-          </a:p>
-          <a:p>
-            <a:r>
-              <a:rPr lang="en-IN" dirty="0" smtClean="0"/>
-              <a:t>Memory </a:t>
-            </a:r>
-            <a:endParaRPr lang="en-IN" dirty="0" smtClean="0"/>
-          </a:p>
-          <a:p>
-            <a:pPr lvl="1"/>
-            <a:r>
-              <a:rPr lang="en-IN" dirty="0" smtClean="0"/>
-              <a:t>2 </a:t>
-            </a:r>
-            <a:r>
-              <a:rPr lang="en-IN" dirty="0" smtClean="0"/>
-              <a:t>GB or 4 GB</a:t>
+          <a:bodyPr>
+            <a:normAutofit fontScale="92500" lnSpcReduction="20000"/>
+          </a:bodyPr>
+          <a:lstStyle/>
+          <a:p>
+            <a:r>
+              <a:rPr lang="en-IN" dirty="0" smtClean="0"/>
+              <a:t>Predict and Infer</a:t>
+            </a:r>
+          </a:p>
+          <a:p>
+            <a:r>
+              <a:rPr lang="en-IN" dirty="0" smtClean="0"/>
+              <a:t>Cloud AI</a:t>
+            </a:r>
+          </a:p>
+          <a:p>
+            <a:r>
+              <a:rPr lang="en-IN" dirty="0" smtClean="0"/>
+              <a:t>Edge AI</a:t>
+            </a:r>
+          </a:p>
+          <a:p>
+            <a:r>
+              <a:rPr lang="en-IN" dirty="0" smtClean="0"/>
+              <a:t>On premises</a:t>
+            </a:r>
+          </a:p>
+          <a:p>
+            <a:r>
+              <a:rPr lang="en-IN" dirty="0" smtClean="0"/>
+              <a:t>Online prediction </a:t>
+            </a:r>
+          </a:p>
+          <a:p>
+            <a:pPr lvl="1"/>
+            <a:r>
+              <a:rPr lang="en-IN" dirty="0" smtClean="0"/>
+              <a:t>Less latency</a:t>
+            </a:r>
+          </a:p>
+          <a:p>
+            <a:r>
+              <a:rPr lang="en-IN" dirty="0" smtClean="0"/>
+              <a:t>Batch prediction </a:t>
+            </a:r>
+          </a:p>
+          <a:p>
+            <a:pPr lvl="1"/>
+            <a:r>
+              <a:rPr lang="en-IN" dirty="0" smtClean="0"/>
+              <a:t>Offline prediction </a:t>
+            </a:r>
+          </a:p>
+          <a:p>
+            <a:pPr lvl="1"/>
+            <a:r>
+              <a:rPr lang="en-IN" dirty="0" smtClean="0"/>
+              <a:t>Large dataset </a:t>
+            </a:r>
+          </a:p>
+          <a:p>
+            <a:pPr lvl="1"/>
+            <a:r>
+              <a:rPr lang="en-IN" dirty="0" smtClean="0"/>
+              <a:t>Offline dataset</a:t>
             </a:r>
             <a:endParaRPr lang="en-IN" dirty="0"/>
           </a:p>
@@ -6182,6 +6111,13 @@
   <p:clrMapOvr>
     <a:masterClrMapping/>
   </p:clrMapOvr>
+  <p:timing>
+    <p:tnLst>
+      <p:par>
+        <p:cTn id="1" dur="indefinite" restart="never" nodeType="tmRoot"/>
+      </p:par>
+    </p:tnLst>
+  </p:timing>
 </p:sld>
 </file>
 
@@ -6219,15 +6155,7 @@
           <a:p>
             <a:r>
               <a:rPr lang="en-IN" dirty="0" smtClean="0"/>
-              <a:t>NVIDIA </a:t>
-            </a:r>
-            <a:r>
-              <a:rPr lang="en-IN" dirty="0" err="1" smtClean="0"/>
-              <a:t>Jetson</a:t>
-            </a:r>
-            <a:r>
-              <a:rPr lang="en-IN" dirty="0" smtClean="0"/>
-              <a:t> Xavier</a:t>
+              <a:t>Cloud AI</a:t>
             </a:r>
             <a:endParaRPr lang="en-IN" dirty="0"/>
           </a:p>
@@ -6249,68 +6177,20 @@
           <a:lstStyle/>
           <a:p>
             <a:r>
-              <a:rPr lang="pt-BR" dirty="0" smtClean="0"/>
-              <a:t>GPU </a:t>
-            </a:r>
-            <a:endParaRPr lang="pt-BR" dirty="0" smtClean="0"/>
-          </a:p>
-          <a:p>
-            <a:pPr lvl="1"/>
-            <a:r>
-              <a:rPr lang="pt-BR" dirty="0" smtClean="0"/>
-              <a:t>NVIDIA </a:t>
-            </a:r>
-            <a:r>
-              <a:rPr lang="pt-BR" dirty="0" smtClean="0"/>
-              <a:t>Volta architecture </a:t>
-            </a:r>
-            <a:endParaRPr lang="pt-BR" dirty="0" smtClean="0"/>
-          </a:p>
-          <a:p>
-            <a:pPr lvl="1"/>
-            <a:r>
-              <a:rPr lang="pt-BR" dirty="0" smtClean="0"/>
-              <a:t>512 </a:t>
-            </a:r>
-            <a:r>
-              <a:rPr lang="pt-BR" dirty="0" smtClean="0"/>
-              <a:t>NVIDIA CUDA cores with Tensor Cores</a:t>
-            </a:r>
-          </a:p>
-          <a:p>
-            <a:r>
-              <a:rPr lang="pt-BR" dirty="0" smtClean="0"/>
-              <a:t>CPU </a:t>
-            </a:r>
-            <a:endParaRPr lang="pt-BR" dirty="0" smtClean="0"/>
-          </a:p>
-          <a:p>
-            <a:pPr lvl="1"/>
-            <a:r>
-              <a:rPr lang="pt-BR" dirty="0" smtClean="0"/>
-              <a:t>8 </a:t>
-            </a:r>
-            <a:r>
-              <a:rPr lang="pt-BR" dirty="0" smtClean="0"/>
-              <a:t>core ARM</a:t>
-            </a:r>
-          </a:p>
-          <a:p>
-            <a:r>
-              <a:rPr lang="pt-BR" dirty="0" smtClean="0"/>
-              <a:t>Memory </a:t>
-            </a:r>
-            <a:endParaRPr lang="pt-BR" dirty="0" smtClean="0"/>
-          </a:p>
-          <a:p>
-            <a:pPr lvl="1"/>
-            <a:r>
-              <a:rPr lang="pt-BR" dirty="0" smtClean="0"/>
-              <a:t>32 </a:t>
-            </a:r>
-            <a:r>
-              <a:rPr lang="pt-BR" dirty="0" smtClean="0"/>
-              <a:t>GB</a:t>
+              <a:rPr lang="en-IN" dirty="0" smtClean="0"/>
+              <a:t>Infrastructure support</a:t>
+            </a:r>
+          </a:p>
+          <a:p>
+            <a:r>
+              <a:rPr lang="en-IN" dirty="0" smtClean="0"/>
+              <a:t>Scalability</a:t>
+            </a:r>
+          </a:p>
+          <a:p>
+            <a:r>
+              <a:rPr lang="en-IN" dirty="0" smtClean="0"/>
+              <a:t>Different services</a:t>
             </a:r>
             <a:endParaRPr lang="en-IN" dirty="0"/>
           </a:p>
@@ -6321,6 +6201,13 @@
   <p:clrMapOvr>
     <a:masterClrMapping/>
   </p:clrMapOvr>
+  <p:timing>
+    <p:tnLst>
+      <p:par>
+        <p:cTn id="1" dur="indefinite" restart="never" nodeType="tmRoot"/>
+      </p:par>
+    </p:tnLst>
+  </p:timing>
 </p:sld>
 </file>
 
@@ -6357,16 +6244,12 @@
           <a:lstStyle/>
           <a:p>
             <a:r>
-              <a:rPr lang="en-IN" dirty="0" smtClean="0"/>
-              <a:t>NVIDIA </a:t>
-            </a:r>
-            <a:r>
-              <a:rPr lang="en-IN" dirty="0" err="1" smtClean="0"/>
-              <a:t>Jetson</a:t>
-            </a:r>
-            <a:r>
-              <a:rPr lang="en-IN" dirty="0" smtClean="0"/>
-              <a:t> Orin</a:t>
+              <a:rPr lang="en-IN" smtClean="0"/>
+              <a:t>Edge </a:t>
+            </a:r>
+            <a:r>
+              <a:rPr lang="en-IN" smtClean="0"/>
+              <a:t>AI</a:t>
             </a:r>
             <a:endParaRPr lang="en-IN" dirty="0"/>
           </a:p>
@@ -6384,86 +6267,39 @@
         </p:nvSpPr>
         <p:spPr/>
         <p:txBody>
-          <a:bodyPr/>
-          <a:lstStyle/>
-          <a:p>
-            <a:r>
-              <a:rPr lang="pt-BR" dirty="0" smtClean="0"/>
-              <a:t>GPU </a:t>
-            </a:r>
-            <a:endParaRPr lang="pt-BR" dirty="0" smtClean="0"/>
-          </a:p>
-          <a:p>
-            <a:pPr lvl="1"/>
-            <a:r>
-              <a:rPr lang="pt-BR" dirty="0" smtClean="0"/>
-              <a:t>NVIDIA </a:t>
-            </a:r>
-            <a:r>
-              <a:rPr lang="pt-BR" dirty="0" smtClean="0"/>
-              <a:t>Ampere architecture </a:t>
-            </a:r>
-            <a:endParaRPr lang="pt-BR" dirty="0" smtClean="0"/>
-          </a:p>
-          <a:p>
-            <a:pPr lvl="1"/>
-            <a:r>
-              <a:rPr lang="pt-BR" dirty="0" smtClean="0"/>
-              <a:t>2048 </a:t>
-            </a:r>
-            <a:r>
-              <a:rPr lang="pt-BR" dirty="0" smtClean="0"/>
-              <a:t>NVIDIA CUDA cores </a:t>
-            </a:r>
-            <a:endParaRPr lang="pt-BR" dirty="0" smtClean="0"/>
-          </a:p>
-          <a:p>
-            <a:pPr lvl="1"/>
-            <a:r>
-              <a:rPr lang="pt-BR" dirty="0" smtClean="0"/>
-              <a:t>64 </a:t>
-            </a:r>
-            <a:r>
-              <a:rPr lang="pt-BR" dirty="0" smtClean="0"/>
-              <a:t>Tensor Core</a:t>
-            </a:r>
-          </a:p>
-          <a:p>
-            <a:r>
-              <a:rPr lang="pt-BR" dirty="0" smtClean="0"/>
-              <a:t>CPU </a:t>
-            </a:r>
-            <a:endParaRPr lang="pt-BR" dirty="0" smtClean="0"/>
-          </a:p>
-          <a:p>
-            <a:pPr lvl="1"/>
-            <a:r>
-              <a:rPr lang="pt-BR" dirty="0" smtClean="0"/>
-              <a:t>12 </a:t>
-            </a:r>
-            <a:r>
-              <a:rPr lang="pt-BR" dirty="0" smtClean="0"/>
-              <a:t>core Arm Cortex</a:t>
-            </a:r>
-          </a:p>
-          <a:p>
-            <a:r>
-              <a:rPr lang="pt-BR" dirty="0" smtClean="0"/>
-              <a:t>Memory </a:t>
-            </a:r>
-            <a:endParaRPr lang="pt-BR" dirty="0" smtClean="0"/>
-          </a:p>
-          <a:p>
-            <a:pPr lvl="1"/>
-            <a:r>
-              <a:rPr lang="pt-BR" dirty="0" smtClean="0"/>
-              <a:t>32 </a:t>
-            </a:r>
-            <a:r>
-              <a:rPr lang="pt-BR" dirty="0" smtClean="0"/>
-              <a:t>GB</a:t>
-            </a:r>
-            <a:endParaRPr lang="en-IN" dirty="0"/>
+          <a:bodyPr>
+            <a:normAutofit/>
+          </a:bodyPr>
+          <a:lstStyle/>
+          <a:p>
+            <a:r>
+              <a:rPr lang="en-IN" dirty="0" smtClean="0"/>
+              <a:t>Run AI algorithm locally at source</a:t>
+            </a:r>
+          </a:p>
+          <a:p>
+            <a:r>
+              <a:rPr lang="en-IN" dirty="0" smtClean="0"/>
+              <a:t>Hardware devices – Edge devices</a:t>
+            </a:r>
+          </a:p>
+          <a:p>
+            <a:r>
+              <a:rPr lang="en-IN" dirty="0" smtClean="0"/>
+              <a:t>Real time decision making </a:t>
+            </a:r>
+          </a:p>
+          <a:p>
+            <a:r>
+              <a:rPr lang="en-IN" dirty="0" smtClean="0"/>
+              <a:t>No need for constant network connectivity</a:t>
+            </a:r>
+          </a:p>
+          <a:p>
+            <a:r>
+              <a:rPr lang="en-IN" dirty="0" smtClean="0"/>
+              <a:t>Low or reduce latency</a:t>
+            </a:r>
           </a:p>
         </p:txBody>
       </p:sp>
@@ -6472,6 +6308,13 @@
   <p:clrMapOvr>
     <a:masterClrMapping/>
   </p:clrMapOvr>
+  <p:timing>
+    <p:tnLst>
+      <p:par>
+        <p:cTn id="1" dur="indefinite" restart="never" nodeType="tmRoot"/>
+      </p:par>
+    </p:tnLst>
+  </p:timing>
 </p:sld>
 </file>
 
@@ -6509,7 +6352,11 @@
           <a:p>
             <a:r>
               <a:rPr lang="en-IN" dirty="0" smtClean="0"/>
-              <a:t>Monitor Model Performance</a:t>
+              <a:t>Edge AI </a:t>
+            </a:r>
+            <a:r>
+              <a:rPr lang="en-IN" dirty="0" smtClean="0"/>
+              <a:t>– Applications </a:t>
             </a:r>
             <a:endParaRPr lang="en-IN" dirty="0"/>
           </a:p>
@@ -6527,20 +6374,36 @@
         </p:nvSpPr>
         <p:spPr/>
         <p:txBody>
-          <a:bodyPr/>
-          <a:lstStyle/>
-          <a:p>
-            <a:r>
-              <a:rPr lang="en-IN" dirty="0" smtClean="0"/>
-              <a:t>Concept drift</a:t>
-            </a:r>
-          </a:p>
-          <a:p>
-            <a:r>
-              <a:rPr lang="en-IN" dirty="0" smtClean="0"/>
-              <a:t>Data drift</a:t>
-            </a:r>
-            <a:endParaRPr lang="en-IN" dirty="0"/>
+          <a:bodyPr>
+            <a:normAutofit/>
+          </a:bodyPr>
+          <a:lstStyle/>
+          <a:p>
+            <a:r>
+              <a:rPr lang="en-IN" dirty="0" smtClean="0"/>
+              <a:t>Autonomous vehicles</a:t>
+            </a:r>
+          </a:p>
+          <a:p>
+            <a:r>
+              <a:rPr lang="en-IN" dirty="0" smtClean="0"/>
+              <a:t>Face recognition or verification</a:t>
+            </a:r>
+          </a:p>
+          <a:p>
+            <a:r>
+              <a:rPr lang="en-IN" dirty="0" smtClean="0"/>
+              <a:t>Vehicle number plate </a:t>
+            </a:r>
+            <a:r>
+              <a:rPr lang="en-IN" dirty="0" smtClean="0"/>
+              <a:t>recognition</a:t>
+            </a:r>
+            <a:r>
+              <a:rPr lang="en-IN" dirty="0" smtClean="0"/>
+              <a:t>  </a:t>
+            </a:r>
+            <a:endParaRPr lang="en-IN" dirty="0" smtClean="0"/>
           </a:p>
         </p:txBody>
       </p:sp>
@@ -6549,6 +6412,13 @@
   <p:clrMapOvr>
     <a:masterClrMapping/>
   </p:clrMapOvr>
+  <p:timing>
+    <p:tnLst>
+      <p:par>
+        <p:cTn id="1" dur="indefinite" restart="never" nodeType="tmRoot"/>
+      </p:par>
+    </p:tnLst>
+  </p:timing>
 </p:sld>
 </file>
 
@@ -6576,42 +6446,370 @@
             <a:spLocks noGrp="1"/>
           </p:cNvSpPr>
           <p:nvPr>
-            <p:ph type="ctrTitle"/>
-          </p:nvPr>
-        </p:nvSpPr>
-        <p:spPr/>
-        <p:txBody>
-          <a:bodyPr/>
-          <a:lstStyle/>
-          <a:p>
-            <a:r>
-              <a:rPr lang="en-US" dirty="0" smtClean="0"/>
-              <a:t>Questions?</a:t>
-            </a:r>
-            <a:endParaRPr lang="en-US" dirty="0"/>
-          </a:p>
-        </p:txBody>
-      </p:sp>
-      <p:sp>
-        <p:nvSpPr>
-          <p:cNvPr id="3" name="Subtitle 2"/>
-          <p:cNvSpPr>
-            <a:spLocks noGrp="1"/>
-          </p:cNvSpPr>
-          <p:nvPr>
-            <p:ph type="subTitle" idx="1"/>
-          </p:nvPr>
-        </p:nvSpPr>
-        <p:spPr/>
-        <p:txBody>
-          <a:bodyPr/>
-          <a:lstStyle/>
-          <a:p>
-            <a:r>
-              <a:rPr lang="en-US" dirty="0" smtClean="0"/>
-              <a:t>Thank you</a:t>
-            </a:r>
-            <a:endParaRPr lang="en-US" dirty="0"/>
+            <p:ph type="title"/>
+          </p:nvPr>
+        </p:nvSpPr>
+        <p:spPr/>
+        <p:txBody>
+          <a:bodyPr/>
+          <a:lstStyle/>
+          <a:p>
+            <a:r>
+              <a:rPr lang="en-IN" dirty="0" smtClean="0"/>
+              <a:t>Edge </a:t>
+            </a:r>
+            <a:r>
+              <a:rPr lang="en-IN" dirty="0" smtClean="0"/>
+              <a:t>AI – Devices</a:t>
+            </a:r>
+            <a:endParaRPr lang="en-IN" dirty="0"/>
+          </a:p>
+        </p:txBody>
+      </p:sp>
+      <p:sp>
+        <p:nvSpPr>
+          <p:cNvPr id="3" name="Content Placeholder 2"/>
+          <p:cNvSpPr>
+            <a:spLocks noGrp="1"/>
+          </p:cNvSpPr>
+          <p:nvPr>
+            <p:ph idx="1"/>
+          </p:nvPr>
+        </p:nvSpPr>
+        <p:spPr/>
+        <p:txBody>
+          <a:bodyPr>
+            <a:normAutofit/>
+          </a:bodyPr>
+          <a:lstStyle/>
+          <a:p>
+            <a:r>
+              <a:rPr lang="en-IN" dirty="0" smtClean="0"/>
+              <a:t>NVIDIA </a:t>
+            </a:r>
+            <a:r>
+              <a:rPr lang="en-IN" dirty="0" err="1" smtClean="0"/>
+              <a:t>Jetson</a:t>
+            </a:r>
+            <a:r>
+              <a:rPr lang="en-IN" dirty="0" smtClean="0"/>
+              <a:t> </a:t>
+            </a:r>
+            <a:r>
+              <a:rPr lang="en-IN" dirty="0" err="1" smtClean="0"/>
+              <a:t>Nano</a:t>
+            </a:r>
+            <a:endParaRPr lang="en-IN" dirty="0" smtClean="0"/>
+          </a:p>
+          <a:p>
+            <a:r>
+              <a:rPr lang="en-IN" dirty="0" smtClean="0"/>
+              <a:t>NVIDIA </a:t>
+            </a:r>
+            <a:r>
+              <a:rPr lang="en-IN" dirty="0" err="1" smtClean="0"/>
+              <a:t>Jetson</a:t>
+            </a:r>
+            <a:r>
+              <a:rPr lang="en-IN" dirty="0" smtClean="0"/>
+              <a:t> </a:t>
+            </a:r>
+            <a:r>
+              <a:rPr lang="en-IN" dirty="0" smtClean="0"/>
+              <a:t>Xavier</a:t>
+            </a:r>
+          </a:p>
+          <a:p>
+            <a:r>
+              <a:rPr lang="en-IN" dirty="0" smtClean="0"/>
+              <a:t>NVIDIA </a:t>
+            </a:r>
+            <a:r>
+              <a:rPr lang="en-IN" dirty="0" err="1" smtClean="0"/>
+              <a:t>Jetson</a:t>
+            </a:r>
+            <a:r>
+              <a:rPr lang="en-IN" dirty="0" smtClean="0"/>
+              <a:t> </a:t>
+            </a:r>
+            <a:r>
+              <a:rPr lang="en-IN" dirty="0" smtClean="0"/>
+              <a:t>Orin</a:t>
+            </a:r>
+            <a:endParaRPr lang="en-IN" dirty="0" smtClean="0"/>
+          </a:p>
+          <a:p>
+            <a:r>
+              <a:rPr lang="en-IN" dirty="0" smtClean="0"/>
+              <a:t>Raspberry Pi 4</a:t>
+            </a:r>
+          </a:p>
+          <a:p>
+            <a:r>
+              <a:rPr lang="en-IN" dirty="0" smtClean="0"/>
+              <a:t>Intel </a:t>
+            </a:r>
+            <a:r>
+              <a:rPr lang="en-IN" dirty="0" err="1" smtClean="0"/>
+              <a:t>Movidius</a:t>
+            </a:r>
+            <a:endParaRPr lang="en-IN" dirty="0"/>
+          </a:p>
+        </p:txBody>
+      </p:sp>
+    </p:spTree>
+  </p:cSld>
+  <p:clrMapOvr>
+    <a:masterClrMapping/>
+  </p:clrMapOvr>
+  <p:timing>
+    <p:tnLst>
+      <p:par>
+        <p:cTn id="1" dur="indefinite" restart="never" nodeType="tmRoot"/>
+      </p:par>
+    </p:tnLst>
+  </p:timing>
+</p:sld>
+</file>
+
+<file path=ppt/slides/slide38.xml><?xml version="1.0" encoding="utf-8"?>
+<p:sld xmlns:a="http://schemas.openxmlformats.org/drawingml/2006/main" xmlns:r="http://schemas.openxmlformats.org/officeDocument/2006/relationships" xmlns:p="http://schemas.openxmlformats.org/presentationml/2006/main">
+  <p:cSld>
+    <p:spTree>
+      <p:nvGrpSpPr>
+        <p:cNvPr id="1" name=""/>
+        <p:cNvGrpSpPr/>
+        <p:nvPr/>
+      </p:nvGrpSpPr>
+      <p:grpSpPr>
+        <a:xfrm>
+          <a:off x="0" y="0"/>
+          <a:ext cx="0" cy="0"/>
+          <a:chOff x="0" y="0"/>
+          <a:chExt cx="0" cy="0"/>
+        </a:xfrm>
+      </p:grpSpPr>
+      <p:sp>
+        <p:nvSpPr>
+          <p:cNvPr id="2" name="Title 1"/>
+          <p:cNvSpPr>
+            <a:spLocks noGrp="1"/>
+          </p:cNvSpPr>
+          <p:nvPr>
+            <p:ph type="title"/>
+          </p:nvPr>
+        </p:nvSpPr>
+        <p:spPr/>
+        <p:txBody>
+          <a:bodyPr/>
+          <a:lstStyle/>
+          <a:p>
+            <a:r>
+              <a:rPr lang="en-IN" dirty="0" smtClean="0"/>
+              <a:t>NVIDIA </a:t>
+            </a:r>
+            <a:r>
+              <a:rPr lang="en-IN" dirty="0" err="1" smtClean="0"/>
+              <a:t>Jetson</a:t>
+            </a:r>
+            <a:r>
+              <a:rPr lang="en-IN" dirty="0" smtClean="0"/>
+              <a:t> </a:t>
+            </a:r>
+            <a:r>
+              <a:rPr lang="en-IN" dirty="0" err="1" smtClean="0"/>
+              <a:t>Nano</a:t>
+            </a:r>
+            <a:endParaRPr lang="en-IN" dirty="0" smtClean="0"/>
+          </a:p>
+        </p:txBody>
+      </p:sp>
+      <p:sp>
+        <p:nvSpPr>
+          <p:cNvPr id="3" name="Content Placeholder 2"/>
+          <p:cNvSpPr>
+            <a:spLocks noGrp="1"/>
+          </p:cNvSpPr>
+          <p:nvPr>
+            <p:ph idx="1"/>
+          </p:nvPr>
+        </p:nvSpPr>
+        <p:spPr/>
+        <p:txBody>
+          <a:bodyPr/>
+          <a:lstStyle/>
+          <a:p>
+            <a:r>
+              <a:rPr lang="en-IN" dirty="0" smtClean="0"/>
+              <a:t>GPU</a:t>
+            </a:r>
+          </a:p>
+          <a:p>
+            <a:pPr lvl="1"/>
+            <a:r>
+              <a:rPr lang="en-IN" dirty="0" smtClean="0"/>
+              <a:t>NVIDIA Maxwell architecture </a:t>
+            </a:r>
+          </a:p>
+          <a:p>
+            <a:pPr lvl="1"/>
+            <a:r>
+              <a:rPr lang="en-IN" dirty="0" smtClean="0"/>
+              <a:t>128 NVIDIA CUDA cores</a:t>
+            </a:r>
+          </a:p>
+          <a:p>
+            <a:r>
+              <a:rPr lang="en-IN" dirty="0" smtClean="0"/>
+              <a:t>CPU </a:t>
+            </a:r>
+          </a:p>
+          <a:p>
+            <a:pPr lvl="1"/>
+            <a:r>
+              <a:rPr lang="en-IN" dirty="0" smtClean="0"/>
+              <a:t>Quad core ARM Cortex</a:t>
+            </a:r>
+          </a:p>
+          <a:p>
+            <a:r>
+              <a:rPr lang="en-IN" dirty="0" smtClean="0"/>
+              <a:t>Memory </a:t>
+            </a:r>
+          </a:p>
+          <a:p>
+            <a:pPr lvl="1"/>
+            <a:r>
+              <a:rPr lang="en-IN" dirty="0" smtClean="0"/>
+              <a:t>2 GB or 4 GB</a:t>
+            </a:r>
+            <a:endParaRPr lang="en-IN" dirty="0"/>
+          </a:p>
+        </p:txBody>
+      </p:sp>
+    </p:spTree>
+  </p:cSld>
+  <p:clrMapOvr>
+    <a:masterClrMapping/>
+  </p:clrMapOvr>
+  <p:timing>
+    <p:tnLst>
+      <p:par>
+        <p:cTn id="1" dur="indefinite" restart="never" nodeType="tmRoot"/>
+      </p:par>
+    </p:tnLst>
+  </p:timing>
+</p:sld>
+</file>
+
+<file path=ppt/slides/slide39.xml><?xml version="1.0" encoding="utf-8"?>
+<p:sld xmlns:a="http://schemas.openxmlformats.org/drawingml/2006/main" xmlns:r="http://schemas.openxmlformats.org/officeDocument/2006/relationships" xmlns:p="http://schemas.openxmlformats.org/presentationml/2006/main">
+  <p:cSld>
+    <p:spTree>
+      <p:nvGrpSpPr>
+        <p:cNvPr id="1" name=""/>
+        <p:cNvGrpSpPr/>
+        <p:nvPr/>
+      </p:nvGrpSpPr>
+      <p:grpSpPr>
+        <a:xfrm>
+          <a:off x="0" y="0"/>
+          <a:ext cx="0" cy="0"/>
+          <a:chOff x="0" y="0"/>
+          <a:chExt cx="0" cy="0"/>
+        </a:xfrm>
+      </p:grpSpPr>
+      <p:sp>
+        <p:nvSpPr>
+          <p:cNvPr id="2" name="Title 1"/>
+          <p:cNvSpPr>
+            <a:spLocks noGrp="1"/>
+          </p:cNvSpPr>
+          <p:nvPr>
+            <p:ph type="title"/>
+          </p:nvPr>
+        </p:nvSpPr>
+        <p:spPr/>
+        <p:txBody>
+          <a:bodyPr/>
+          <a:lstStyle/>
+          <a:p>
+            <a:r>
+              <a:rPr lang="en-IN" dirty="0" smtClean="0"/>
+              <a:t>NVIDIA </a:t>
+            </a:r>
+            <a:r>
+              <a:rPr lang="en-IN" dirty="0" err="1" smtClean="0"/>
+              <a:t>Jetson</a:t>
+            </a:r>
+            <a:r>
+              <a:rPr lang="en-IN" dirty="0" smtClean="0"/>
+              <a:t> Xavier</a:t>
+            </a:r>
+            <a:endParaRPr lang="en-IN" dirty="0"/>
+          </a:p>
+        </p:txBody>
+      </p:sp>
+      <p:sp>
+        <p:nvSpPr>
+          <p:cNvPr id="3" name="Content Placeholder 2"/>
+          <p:cNvSpPr>
+            <a:spLocks noGrp="1"/>
+          </p:cNvSpPr>
+          <p:nvPr>
+            <p:ph idx="1"/>
+          </p:nvPr>
+        </p:nvSpPr>
+        <p:spPr/>
+        <p:txBody>
+          <a:bodyPr/>
+          <a:lstStyle/>
+          <a:p>
+            <a:r>
+              <a:rPr lang="pt-BR" dirty="0" smtClean="0"/>
+              <a:t>GPU </a:t>
+            </a:r>
+          </a:p>
+          <a:p>
+            <a:pPr lvl="1"/>
+            <a:r>
+              <a:rPr lang="pt-BR" dirty="0" smtClean="0"/>
+              <a:t>NVIDIA Volta architecture </a:t>
+            </a:r>
+          </a:p>
+          <a:p>
+            <a:pPr lvl="1"/>
+            <a:r>
+              <a:rPr lang="pt-BR" dirty="0" smtClean="0"/>
+              <a:t>512 NVIDIA CUDA cores with Tensor Cores</a:t>
+            </a:r>
+          </a:p>
+          <a:p>
+            <a:r>
+              <a:rPr lang="pt-BR" dirty="0" smtClean="0"/>
+              <a:t>CPU </a:t>
+            </a:r>
+          </a:p>
+          <a:p>
+            <a:pPr lvl="1"/>
+            <a:r>
+              <a:rPr lang="pt-BR" dirty="0" smtClean="0"/>
+              <a:t>8 core ARM</a:t>
+            </a:r>
+          </a:p>
+          <a:p>
+            <a:r>
+              <a:rPr lang="pt-BR" dirty="0" smtClean="0"/>
+              <a:t>Memory </a:t>
+            </a:r>
+          </a:p>
+          <a:p>
+            <a:pPr lvl="1"/>
+            <a:r>
+              <a:rPr lang="pt-BR" dirty="0" smtClean="0"/>
+              <a:t>32 GB</a:t>
+            </a:r>
+            <a:endParaRPr lang="en-IN" dirty="0"/>
           </a:p>
         </p:txBody>
       </p:sp>
@@ -6664,7 +6862,7 @@
           <a:p>
             <a:r>
               <a:rPr lang="en-IN" dirty="0" smtClean="0"/>
-              <a:t>Project Scoping</a:t>
+              <a:t>Identify Project</a:t>
             </a:r>
             <a:endParaRPr lang="en-IN" dirty="0"/>
           </a:p>
@@ -6687,48 +6885,469 @@
           <a:p>
             <a:r>
               <a:rPr lang="en-IN" dirty="0" smtClean="0"/>
-              <a:t>Identify project</a:t>
-            </a:r>
-          </a:p>
-          <a:p>
-            <a:r>
-              <a:rPr lang="en-IN" dirty="0" smtClean="0"/>
-              <a:t>Determine milestones</a:t>
-            </a:r>
-          </a:p>
-          <a:p>
-            <a:r>
-              <a:rPr lang="en-IN" dirty="0" smtClean="0"/>
-              <a:t>Define metrics</a:t>
-            </a:r>
-          </a:p>
-          <a:p>
-            <a:r>
-              <a:rPr lang="en-IN" dirty="0" smtClean="0"/>
-              <a:t>Estimate resource requirement </a:t>
-            </a:r>
-          </a:p>
-          <a:p>
-            <a:pPr lvl="1"/>
-            <a:r>
-              <a:rPr lang="en-IN" dirty="0" smtClean="0"/>
-              <a:t>Data</a:t>
-            </a:r>
-          </a:p>
-          <a:p>
-            <a:pPr lvl="1"/>
-            <a:r>
-              <a:rPr lang="en-IN" dirty="0" smtClean="0"/>
-              <a:t>Time</a:t>
-            </a:r>
-          </a:p>
-          <a:p>
-            <a:pPr lvl="1"/>
-            <a:r>
-              <a:rPr lang="en-IN" dirty="0" smtClean="0"/>
-              <a:t>People</a:t>
+              <a:t>Problems</a:t>
+            </a:r>
+          </a:p>
+          <a:p>
+            <a:pPr lvl="1"/>
+            <a:r>
+              <a:rPr lang="en-IN" dirty="0" smtClean="0"/>
+              <a:t>What ? – Domain experts – Identify problems</a:t>
+            </a:r>
+          </a:p>
+          <a:p>
+            <a:r>
+              <a:rPr lang="en-IN" dirty="0" smtClean="0"/>
+              <a:t>Solutions</a:t>
+            </a:r>
+          </a:p>
+          <a:p>
+            <a:pPr lvl="1"/>
+            <a:r>
+              <a:rPr lang="en-IN" dirty="0" smtClean="0"/>
+              <a:t>How ? – AI experts – Indentify solutions to problems</a:t>
+            </a:r>
+          </a:p>
+          <a:p>
+            <a:r>
+              <a:rPr lang="en-IN" dirty="0" smtClean="0"/>
+              <a:t>Access project feasibility</a:t>
+            </a:r>
+          </a:p>
+          <a:p>
+            <a:r>
+              <a:rPr lang="en-IN" dirty="0" smtClean="0"/>
+              <a:t>Access project value</a:t>
+            </a:r>
+          </a:p>
+          <a:p>
+            <a:r>
+              <a:rPr lang="en-IN" dirty="0" smtClean="0"/>
+              <a:t>Select valuable and feasible problems</a:t>
             </a:r>
             <a:endParaRPr lang="en-IN" dirty="0"/>
+          </a:p>
+        </p:txBody>
+      </p:sp>
+    </p:spTree>
+  </p:cSld>
+  <p:clrMapOvr>
+    <a:masterClrMapping/>
+  </p:clrMapOvr>
+  <p:timing>
+    <p:tnLst>
+      <p:par>
+        <p:cTn id="1" dur="indefinite" restart="never" nodeType="tmRoot"/>
+      </p:par>
+    </p:tnLst>
+  </p:timing>
+</p:sld>
+</file>
+
+<file path=ppt/slides/slide40.xml><?xml version="1.0" encoding="utf-8"?>
+<p:sld xmlns:a="http://schemas.openxmlformats.org/drawingml/2006/main" xmlns:r="http://schemas.openxmlformats.org/officeDocument/2006/relationships" xmlns:p="http://schemas.openxmlformats.org/presentationml/2006/main">
+  <p:cSld>
+    <p:spTree>
+      <p:nvGrpSpPr>
+        <p:cNvPr id="1" name=""/>
+        <p:cNvGrpSpPr/>
+        <p:nvPr/>
+      </p:nvGrpSpPr>
+      <p:grpSpPr>
+        <a:xfrm>
+          <a:off x="0" y="0"/>
+          <a:ext cx="0" cy="0"/>
+          <a:chOff x="0" y="0"/>
+          <a:chExt cx="0" cy="0"/>
+        </a:xfrm>
+      </p:grpSpPr>
+      <p:sp>
+        <p:nvSpPr>
+          <p:cNvPr id="2" name="Title 1"/>
+          <p:cNvSpPr>
+            <a:spLocks noGrp="1"/>
+          </p:cNvSpPr>
+          <p:nvPr>
+            <p:ph type="title"/>
+          </p:nvPr>
+        </p:nvSpPr>
+        <p:spPr/>
+        <p:txBody>
+          <a:bodyPr/>
+          <a:lstStyle/>
+          <a:p>
+            <a:r>
+              <a:rPr lang="en-IN" dirty="0" smtClean="0"/>
+              <a:t>NVIDIA </a:t>
+            </a:r>
+            <a:r>
+              <a:rPr lang="en-IN" dirty="0" err="1" smtClean="0"/>
+              <a:t>Jetson</a:t>
+            </a:r>
+            <a:r>
+              <a:rPr lang="en-IN" dirty="0" smtClean="0"/>
+              <a:t> Orin</a:t>
+            </a:r>
+            <a:endParaRPr lang="en-IN" dirty="0"/>
+          </a:p>
+        </p:txBody>
+      </p:sp>
+      <p:sp>
+        <p:nvSpPr>
+          <p:cNvPr id="3" name="Content Placeholder 2"/>
+          <p:cNvSpPr>
+            <a:spLocks noGrp="1"/>
+          </p:cNvSpPr>
+          <p:nvPr>
+            <p:ph idx="1"/>
+          </p:nvPr>
+        </p:nvSpPr>
+        <p:spPr/>
+        <p:txBody>
+          <a:bodyPr/>
+          <a:lstStyle/>
+          <a:p>
+            <a:r>
+              <a:rPr lang="pt-BR" dirty="0" smtClean="0"/>
+              <a:t>GPU </a:t>
+            </a:r>
+          </a:p>
+          <a:p>
+            <a:pPr lvl="1"/>
+            <a:r>
+              <a:rPr lang="pt-BR" dirty="0" smtClean="0"/>
+              <a:t>NVIDIA Ampere architecture </a:t>
+            </a:r>
+          </a:p>
+          <a:p>
+            <a:pPr lvl="1"/>
+            <a:r>
+              <a:rPr lang="pt-BR" dirty="0" smtClean="0"/>
+              <a:t>2048 NVIDIA CUDA cores </a:t>
+            </a:r>
+          </a:p>
+          <a:p>
+            <a:pPr lvl="1"/>
+            <a:r>
+              <a:rPr lang="pt-BR" dirty="0" smtClean="0"/>
+              <a:t>64 Tensor Core</a:t>
+            </a:r>
+          </a:p>
+          <a:p>
+            <a:r>
+              <a:rPr lang="pt-BR" dirty="0" smtClean="0"/>
+              <a:t>CPU </a:t>
+            </a:r>
+          </a:p>
+          <a:p>
+            <a:pPr lvl="1"/>
+            <a:r>
+              <a:rPr lang="pt-BR" dirty="0" smtClean="0"/>
+              <a:t>12 core Arm Cortex</a:t>
+            </a:r>
+          </a:p>
+          <a:p>
+            <a:r>
+              <a:rPr lang="pt-BR" dirty="0" smtClean="0"/>
+              <a:t>Memory </a:t>
+            </a:r>
+          </a:p>
+          <a:p>
+            <a:pPr lvl="1"/>
+            <a:r>
+              <a:rPr lang="pt-BR" dirty="0" smtClean="0"/>
+              <a:t>32 GB</a:t>
+            </a:r>
+            <a:endParaRPr lang="en-IN" dirty="0"/>
+          </a:p>
+        </p:txBody>
+      </p:sp>
+    </p:spTree>
+  </p:cSld>
+  <p:clrMapOvr>
+    <a:masterClrMapping/>
+  </p:clrMapOvr>
+  <p:timing>
+    <p:tnLst>
+      <p:par>
+        <p:cTn id="1" dur="indefinite" restart="never" nodeType="tmRoot"/>
+      </p:par>
+    </p:tnLst>
+  </p:timing>
+</p:sld>
+</file>
+
+<file path=ppt/slides/slide41.xml><?xml version="1.0" encoding="utf-8"?>
+<p:sld xmlns:a="http://schemas.openxmlformats.org/drawingml/2006/main" xmlns:r="http://schemas.openxmlformats.org/officeDocument/2006/relationships" xmlns:p="http://schemas.openxmlformats.org/presentationml/2006/main">
+  <p:cSld>
+    <p:spTree>
+      <p:nvGrpSpPr>
+        <p:cNvPr id="1" name=""/>
+        <p:cNvGrpSpPr/>
+        <p:nvPr/>
+      </p:nvGrpSpPr>
+      <p:grpSpPr>
+        <a:xfrm>
+          <a:off x="0" y="0"/>
+          <a:ext cx="0" cy="0"/>
+          <a:chOff x="0" y="0"/>
+          <a:chExt cx="0" cy="0"/>
+        </a:xfrm>
+      </p:grpSpPr>
+      <p:sp>
+        <p:nvSpPr>
+          <p:cNvPr id="2" name="Title 1"/>
+          <p:cNvSpPr>
+            <a:spLocks noGrp="1"/>
+          </p:cNvSpPr>
+          <p:nvPr>
+            <p:ph type="title"/>
+          </p:nvPr>
+        </p:nvSpPr>
+        <p:spPr/>
+        <p:txBody>
+          <a:bodyPr/>
+          <a:lstStyle/>
+          <a:p>
+            <a:r>
+              <a:rPr lang="en-IN" dirty="0" smtClean="0"/>
+              <a:t>Raspberry Pi 4</a:t>
+            </a:r>
+            <a:endParaRPr lang="en-IN" dirty="0"/>
+          </a:p>
+        </p:txBody>
+      </p:sp>
+      <p:sp>
+        <p:nvSpPr>
+          <p:cNvPr id="3" name="Content Placeholder 2"/>
+          <p:cNvSpPr>
+            <a:spLocks noGrp="1"/>
+          </p:cNvSpPr>
+          <p:nvPr>
+            <p:ph idx="1"/>
+          </p:nvPr>
+        </p:nvSpPr>
+        <p:spPr/>
+        <p:txBody>
+          <a:bodyPr>
+            <a:normAutofit/>
+          </a:bodyPr>
+          <a:lstStyle/>
+          <a:p>
+            <a:r>
+              <a:rPr lang="pt-BR" dirty="0" smtClean="0"/>
+              <a:t>CPU </a:t>
+            </a:r>
+          </a:p>
+          <a:p>
+            <a:pPr lvl="1"/>
+            <a:r>
+              <a:rPr lang="pt-BR" dirty="0" smtClean="0"/>
+              <a:t>Quad core Cortex-A72 (ARM v8</a:t>
+            </a:r>
+            <a:r>
+              <a:rPr lang="pt-BR" dirty="0" smtClean="0"/>
+              <a:t>)</a:t>
+            </a:r>
+            <a:endParaRPr lang="pt-BR" dirty="0" smtClean="0"/>
+          </a:p>
+          <a:p>
+            <a:r>
+              <a:rPr lang="pt-BR" dirty="0" smtClean="0"/>
+              <a:t>GPU </a:t>
+            </a:r>
+            <a:endParaRPr lang="pt-BR" dirty="0" smtClean="0"/>
+          </a:p>
+          <a:p>
+            <a:pPr lvl="1"/>
+            <a:r>
+              <a:rPr lang="pt-BR" dirty="0" smtClean="0"/>
+              <a:t>Broadcom VideoCore</a:t>
+            </a:r>
+            <a:endParaRPr lang="pt-BR" dirty="0" smtClean="0"/>
+          </a:p>
+          <a:p>
+            <a:r>
+              <a:rPr lang="pt-BR" dirty="0" smtClean="0"/>
+              <a:t>Memory </a:t>
+            </a:r>
+            <a:endParaRPr lang="pt-BR" dirty="0" smtClean="0"/>
+          </a:p>
+          <a:p>
+            <a:pPr lvl="1"/>
+            <a:r>
+              <a:rPr lang="en-IN" dirty="0" smtClean="0"/>
+              <a:t>1GB, 2GB, 4GB or 8GB</a:t>
+            </a:r>
+            <a:endParaRPr lang="en-IN" dirty="0"/>
+          </a:p>
+        </p:txBody>
+      </p:sp>
+    </p:spTree>
+  </p:cSld>
+  <p:clrMapOvr>
+    <a:masterClrMapping/>
+  </p:clrMapOvr>
+  <p:timing>
+    <p:tnLst>
+      <p:par>
+        <p:cTn id="1" dur="indefinite" restart="never" nodeType="tmRoot"/>
+      </p:par>
+    </p:tnLst>
+  </p:timing>
+</p:sld>
+</file>
+
+<file path=ppt/slides/slide42.xml><?xml version="1.0" encoding="utf-8"?>
+<p:sld xmlns:a="http://schemas.openxmlformats.org/drawingml/2006/main" xmlns:r="http://schemas.openxmlformats.org/officeDocument/2006/relationships" xmlns:p="http://schemas.openxmlformats.org/presentationml/2006/main">
+  <p:cSld>
+    <p:spTree>
+      <p:nvGrpSpPr>
+        <p:cNvPr id="1" name=""/>
+        <p:cNvGrpSpPr/>
+        <p:nvPr/>
+      </p:nvGrpSpPr>
+      <p:grpSpPr>
+        <a:xfrm>
+          <a:off x="0" y="0"/>
+          <a:ext cx="0" cy="0"/>
+          <a:chOff x="0" y="0"/>
+          <a:chExt cx="0" cy="0"/>
+        </a:xfrm>
+      </p:grpSpPr>
+      <p:sp>
+        <p:nvSpPr>
+          <p:cNvPr id="2" name="Title 1"/>
+          <p:cNvSpPr>
+            <a:spLocks noGrp="1"/>
+          </p:cNvSpPr>
+          <p:nvPr>
+            <p:ph type="title"/>
+          </p:nvPr>
+        </p:nvSpPr>
+        <p:spPr/>
+        <p:txBody>
+          <a:bodyPr/>
+          <a:lstStyle/>
+          <a:p>
+            <a:r>
+              <a:rPr lang="en-IN" dirty="0" smtClean="0"/>
+              <a:t>Monitor Model Performance</a:t>
+            </a:r>
+            <a:endParaRPr lang="en-IN" dirty="0"/>
+          </a:p>
+        </p:txBody>
+      </p:sp>
+      <p:sp>
+        <p:nvSpPr>
+          <p:cNvPr id="3" name="Content Placeholder 2"/>
+          <p:cNvSpPr>
+            <a:spLocks noGrp="1"/>
+          </p:cNvSpPr>
+          <p:nvPr>
+            <p:ph idx="1"/>
+          </p:nvPr>
+        </p:nvSpPr>
+        <p:spPr/>
+        <p:txBody>
+          <a:bodyPr/>
+          <a:lstStyle/>
+          <a:p>
+            <a:r>
+              <a:rPr lang="en-IN" dirty="0" smtClean="0"/>
+              <a:t>Data drift</a:t>
+            </a:r>
+          </a:p>
+          <a:p>
+            <a:r>
+              <a:rPr lang="en-IN" dirty="0" smtClean="0"/>
+              <a:t>Concept </a:t>
+            </a:r>
+            <a:r>
+              <a:rPr lang="en-IN" dirty="0" smtClean="0"/>
+              <a:t>drift</a:t>
+            </a:r>
+          </a:p>
+          <a:p>
+            <a:endParaRPr lang="en-IN" dirty="0"/>
+          </a:p>
+        </p:txBody>
+      </p:sp>
+    </p:spTree>
+  </p:cSld>
+  <p:clrMapOvr>
+    <a:masterClrMapping/>
+  </p:clrMapOvr>
+  <p:timing>
+    <p:tnLst>
+      <p:par>
+        <p:cTn id="1" dur="indefinite" restart="never" nodeType="tmRoot"/>
+      </p:par>
+    </p:tnLst>
+  </p:timing>
+</p:sld>
+</file>
+
+<file path=ppt/slides/slide43.xml><?xml version="1.0" encoding="utf-8"?>
+<p:sld xmlns:a="http://schemas.openxmlformats.org/drawingml/2006/main" xmlns:r="http://schemas.openxmlformats.org/officeDocument/2006/relationships" xmlns:p="http://schemas.openxmlformats.org/presentationml/2006/main">
+  <p:cSld>
+    <p:spTree>
+      <p:nvGrpSpPr>
+        <p:cNvPr id="1" name=""/>
+        <p:cNvGrpSpPr/>
+        <p:nvPr/>
+      </p:nvGrpSpPr>
+      <p:grpSpPr>
+        <a:xfrm>
+          <a:off x="0" y="0"/>
+          <a:ext cx="0" cy="0"/>
+          <a:chOff x="0" y="0"/>
+          <a:chExt cx="0" cy="0"/>
+        </a:xfrm>
+      </p:grpSpPr>
+      <p:sp>
+        <p:nvSpPr>
+          <p:cNvPr id="2" name="Title 1"/>
+          <p:cNvSpPr>
+            <a:spLocks noGrp="1"/>
+          </p:cNvSpPr>
+          <p:nvPr>
+            <p:ph type="ctrTitle"/>
+          </p:nvPr>
+        </p:nvSpPr>
+        <p:spPr/>
+        <p:txBody>
+          <a:bodyPr/>
+          <a:lstStyle/>
+          <a:p>
+            <a:r>
+              <a:rPr lang="en-US" dirty="0" smtClean="0"/>
+              <a:t>Questions?</a:t>
+            </a:r>
+            <a:endParaRPr lang="en-US" dirty="0"/>
+          </a:p>
+        </p:txBody>
+      </p:sp>
+      <p:sp>
+        <p:nvSpPr>
+          <p:cNvPr id="3" name="Subtitle 2"/>
+          <p:cNvSpPr>
+            <a:spLocks noGrp="1"/>
+          </p:cNvSpPr>
+          <p:nvPr>
+            <p:ph type="subTitle" idx="1"/>
+          </p:nvPr>
+        </p:nvSpPr>
+        <p:spPr/>
+        <p:txBody>
+          <a:bodyPr/>
+          <a:lstStyle/>
+          <a:p>
+            <a:r>
+              <a:rPr lang="en-US" dirty="0" smtClean="0"/>
+              <a:t>Thank you</a:t>
+            </a:r>
+            <a:endParaRPr lang="en-US" dirty="0"/>
           </a:p>
         </p:txBody>
       </p:sp>
@@ -6781,7 +7400,7 @@
           <a:p>
             <a:r>
               <a:rPr lang="en-IN" dirty="0" smtClean="0"/>
-              <a:t>Identify Project</a:t>
+              <a:t>Access Project Feasibility</a:t>
             </a:r>
             <a:endParaRPr lang="en-IN" dirty="0"/>
           </a:p>
@@ -6804,47 +7423,46 @@
           <a:p>
             <a:r>
               <a:rPr lang="en-IN" dirty="0" smtClean="0"/>
-              <a:t>Problems</a:t>
-            </a:r>
-          </a:p>
-          <a:p>
-            <a:pPr lvl="1"/>
-            <a:r>
-              <a:rPr lang="en-IN" dirty="0" smtClean="0"/>
-              <a:t>What ? – Domain experts – Identify problems</a:t>
-            </a:r>
-          </a:p>
-          <a:p>
-            <a:r>
-              <a:rPr lang="en-IN" dirty="0" smtClean="0"/>
-              <a:t>Solutions</a:t>
-            </a:r>
-          </a:p>
-          <a:p>
-            <a:pPr lvl="1"/>
-            <a:r>
-              <a:rPr lang="en-IN" dirty="0" smtClean="0"/>
-              <a:t>How ? – AI experts – Indentify solutions to problems</a:t>
-            </a:r>
-          </a:p>
-          <a:p>
-            <a:r>
-              <a:rPr lang="en-IN" dirty="0" smtClean="0"/>
-              <a:t>Access project feasibility</a:t>
-            </a:r>
-          </a:p>
-          <a:p>
-            <a:r>
-              <a:rPr lang="en-IN" dirty="0" smtClean="0"/>
-              <a:t>Access project value</a:t>
-            </a:r>
-          </a:p>
-          <a:p>
-            <a:r>
-              <a:rPr lang="en-IN" dirty="0" smtClean="0"/>
-              <a:t>Select valuable and feasible problems</a:t>
-            </a:r>
-            <a:endParaRPr lang="en-IN" dirty="0"/>
+              <a:t>Previous project history </a:t>
+            </a:r>
+          </a:p>
+          <a:p>
+            <a:pPr lvl="1"/>
+            <a:r>
+              <a:rPr lang="en-IN" dirty="0" smtClean="0"/>
+              <a:t>Estimate project progress</a:t>
+            </a:r>
+          </a:p>
+          <a:p>
+            <a:pPr lvl="1"/>
+            <a:r>
+              <a:rPr lang="en-IN" smtClean="0"/>
+              <a:t>Structured </a:t>
+            </a:r>
+            <a:r>
+              <a:rPr lang="en-IN" dirty="0" smtClean="0"/>
+              <a:t>dataset</a:t>
+            </a:r>
+          </a:p>
+          <a:p>
+            <a:pPr lvl="1"/>
+            <a:r>
+              <a:rPr lang="en-IN" dirty="0" smtClean="0"/>
+              <a:t>Unstructured dataset</a:t>
+            </a:r>
+          </a:p>
+          <a:p>
+            <a:r>
+              <a:rPr lang="en-IN" dirty="0" smtClean="0"/>
+              <a:t>Human Level Performance (HLP) </a:t>
+            </a:r>
+          </a:p>
+          <a:p>
+            <a:pPr lvl="1"/>
+            <a:r>
+              <a:rPr lang="en-IN" dirty="0" smtClean="0"/>
+              <a:t>Unstructured dataset</a:t>
+            </a:r>
           </a:p>
         </p:txBody>
       </p:sp>
@@ -6897,7 +7515,7 @@
           <a:p>
             <a:r>
               <a:rPr lang="en-IN" dirty="0" smtClean="0"/>
-              <a:t>Access Project Feasibility</a:t>
+              <a:t>Define Metrics – Search Engine (1)</a:t>
             </a:r>
             <a:endParaRPr lang="en-IN" dirty="0"/>
           </a:p>
@@ -6915,50 +7533,40 @@
         </p:nvSpPr>
         <p:spPr/>
         <p:txBody>
-          <a:bodyPr/>
-          <a:lstStyle/>
-          <a:p>
-            <a:r>
-              <a:rPr lang="en-IN" dirty="0" smtClean="0"/>
-              <a:t>Previous project history </a:t>
-            </a:r>
-          </a:p>
-          <a:p>
-            <a:pPr lvl="1"/>
-            <a:r>
-              <a:rPr lang="en-IN" dirty="0" smtClean="0"/>
-              <a:t>Estimate project progress</a:t>
-            </a:r>
-          </a:p>
-          <a:p>
-            <a:pPr lvl="1"/>
-            <a:r>
-              <a:rPr lang="en-IN" smtClean="0"/>
-              <a:t>Structured </a:t>
-            </a:r>
-            <a:r>
-              <a:rPr lang="en-IN" dirty="0" smtClean="0"/>
-              <a:t>dataset</a:t>
-            </a:r>
-          </a:p>
-          <a:p>
-            <a:pPr lvl="1"/>
-            <a:r>
-              <a:rPr lang="en-IN" dirty="0" smtClean="0"/>
-              <a:t>Unstructured dataset</a:t>
-            </a:r>
-          </a:p>
-          <a:p>
-            <a:r>
-              <a:rPr lang="en-IN" dirty="0" smtClean="0"/>
-              <a:t>Human Level Performance (HLP) </a:t>
-            </a:r>
-          </a:p>
-          <a:p>
-            <a:pPr lvl="1"/>
-            <a:r>
-              <a:rPr lang="en-IN" dirty="0" smtClean="0"/>
-              <a:t>Unstructured dataset</a:t>
+          <a:bodyPr>
+            <a:normAutofit/>
+          </a:bodyPr>
+          <a:lstStyle/>
+          <a:p>
+            <a:r>
+              <a:rPr lang="en-IN" dirty="0" smtClean="0"/>
+              <a:t>Machine learning metrics </a:t>
+            </a:r>
+          </a:p>
+          <a:p>
+            <a:pPr lvl="1"/>
+            <a:r>
+              <a:rPr lang="en-IN" dirty="0" smtClean="0"/>
+              <a:t>Word level accuracy</a:t>
+            </a:r>
+          </a:p>
+          <a:p>
+            <a:r>
+              <a:rPr lang="en-IN" dirty="0" smtClean="0"/>
+              <a:t>Software metrics</a:t>
+            </a:r>
+          </a:p>
+          <a:p>
+            <a:r>
+              <a:rPr lang="en-IN" dirty="0" smtClean="0"/>
+              <a:t>Business metrics </a:t>
+            </a:r>
+          </a:p>
+          <a:p>
+            <a:pPr lvl="1"/>
+            <a:r>
+              <a:rPr lang="en-IN" dirty="0" smtClean="0"/>
+              <a:t>Revenue</a:t>
             </a:r>
           </a:p>
         </p:txBody>
@@ -7012,7 +7620,7 @@
           <a:p>
             <a:r>
               <a:rPr lang="en-IN" dirty="0" smtClean="0"/>
-              <a:t>Define Metrics – Search Engine (1)</a:t>
+              <a:t>Define Metrics – Search Engine (2)</a:t>
             </a:r>
             <a:endParaRPr lang="en-IN" dirty="0"/>
           </a:p>
@@ -7037,30 +7645,22 @@
           <a:p>
             <a:r>
               <a:rPr lang="en-IN" dirty="0" smtClean="0"/>
-              <a:t>Machine learning metrics </a:t>
-            </a:r>
-          </a:p>
-          <a:p>
-            <a:pPr lvl="1"/>
-            <a:r>
-              <a:rPr lang="en-IN" dirty="0" smtClean="0"/>
-              <a:t>Word level accuracy</a:t>
-            </a:r>
-          </a:p>
-          <a:p>
-            <a:r>
-              <a:rPr lang="en-IN" dirty="0" smtClean="0"/>
-              <a:t>Software metrics</a:t>
-            </a:r>
-          </a:p>
-          <a:p>
-            <a:r>
-              <a:rPr lang="en-IN" dirty="0" smtClean="0"/>
-              <a:t>Business metrics </a:t>
-            </a:r>
-          </a:p>
-          <a:p>
-            <a:pPr lvl="1"/>
+              <a:t>Word level accuracy </a:t>
+            </a:r>
+          </a:p>
+          <a:p>
+            <a:r>
+              <a:rPr lang="en-IN" dirty="0" smtClean="0"/>
+              <a:t>Query level accuracy </a:t>
+            </a:r>
+          </a:p>
+          <a:p>
+            <a:r>
+              <a:rPr lang="en-IN" dirty="0" smtClean="0"/>
+              <a:t>Search result quality </a:t>
+            </a:r>
+          </a:p>
+          <a:p>
             <a:r>
               <a:rPr lang="en-IN" dirty="0" smtClean="0"/>
               <a:t>Revenue</a:t>
@@ -7117,7 +7717,7 @@
           <a:p>
             <a:r>
               <a:rPr lang="en-IN" dirty="0" smtClean="0"/>
-              <a:t>Define Metrics – Search Engine (2)</a:t>
+              <a:t>Define Metrics – Search Engine (3)</a:t>
             </a:r>
             <a:endParaRPr lang="en-IN" dirty="0"/>
           </a:p>
@@ -7142,26 +7742,21 @@
           <a:p>
             <a:r>
               <a:rPr lang="en-IN" dirty="0" smtClean="0"/>
-              <a:t>Word level accuracy </a:t>
-            </a:r>
-          </a:p>
-          <a:p>
-            <a:r>
-              <a:rPr lang="en-IN" dirty="0" smtClean="0"/>
-              <a:t>Query level accuracy </a:t>
-            </a:r>
-          </a:p>
-          <a:p>
-            <a:r>
-              <a:rPr lang="en-IN" dirty="0" smtClean="0"/>
-              <a:t>Search result quality </a:t>
-            </a:r>
-          </a:p>
-          <a:p>
-            <a:r>
-              <a:rPr lang="en-IN" dirty="0" smtClean="0"/>
-              <a:t>Revenue</a:t>
-            </a:r>
+              <a:t>Define initial metrics</a:t>
+            </a:r>
+          </a:p>
+          <a:p>
+            <a:r>
+              <a:rPr lang="en-IN" dirty="0" smtClean="0"/>
+              <a:t>Improve performance towards business metrics</a:t>
+            </a:r>
+          </a:p>
+          <a:p>
+            <a:r>
+              <a:rPr lang="en-IN" dirty="0" smtClean="0"/>
+              <a:t>Estimate of business metrics from machine learning metrics</a:t>
+            </a:r>
+            <a:endParaRPr lang="en-IN" dirty="0"/>
           </a:p>
         </p:txBody>
       </p:sp>
@@ -7214,7 +7809,7 @@
           <a:p>
             <a:r>
               <a:rPr lang="en-IN" dirty="0" smtClean="0"/>
-              <a:t>Define Metrics – Search Engine (3)</a:t>
+              <a:t>Dataset Collection</a:t>
             </a:r>
             <a:endParaRPr lang="en-IN" dirty="0"/>
           </a:p>
@@ -7239,19 +7834,37 @@
           <a:p>
             <a:r>
               <a:rPr lang="en-IN" dirty="0" smtClean="0"/>
-              <a:t>Define initial metrics</a:t>
-            </a:r>
-          </a:p>
-          <a:p>
-            <a:r>
-              <a:rPr lang="en-IN" dirty="0" smtClean="0"/>
-              <a:t>Improve performance towards business metrics</a:t>
-            </a:r>
-          </a:p>
-          <a:p>
-            <a:r>
-              <a:rPr lang="en-IN" dirty="0" smtClean="0"/>
-              <a:t>Estimate of business metrics from machine learning metrics</a:t>
+              <a:t>Machine learning dataset types</a:t>
+            </a:r>
+          </a:p>
+          <a:p>
+            <a:r>
+              <a:rPr lang="en-IN" dirty="0" smtClean="0"/>
+              <a:t>Establish baseline</a:t>
+            </a:r>
+          </a:p>
+          <a:p>
+            <a:r>
+              <a:rPr lang="en-IN" dirty="0" smtClean="0"/>
+              <a:t>Label dataset</a:t>
+            </a:r>
+          </a:p>
+          <a:p>
+            <a:r>
+              <a:rPr lang="en-IN" dirty="0" smtClean="0"/>
+              <a:t>Validate dataset</a:t>
+            </a:r>
+          </a:p>
+          <a:p>
+            <a:r>
+              <a:rPr lang="en-IN" dirty="0" smtClean="0"/>
+              <a:t>Organize dataset</a:t>
+            </a:r>
+          </a:p>
+          <a:p>
+            <a:r>
+              <a:rPr lang="en-IN" dirty="0" smtClean="0"/>
+              <a:t>Feature engineering</a:t>
             </a:r>
             <a:endParaRPr lang="en-IN" dirty="0"/>
           </a:p>

</xml_diff>